<commit_message>
updated with another measurement data
</commit_message>
<xml_diff>
--- a/RobotArm.pptx
+++ b/RobotArm.pptx
@@ -3408,6 +3408,45 @@
       <p:grpSpPr/>
       <p:sp>
         <p:nvSpPr>
+          <p:cNvPr id="3" name="圆柱形 2"/>
+          <p:cNvSpPr/>
+          <p:nvPr/>
+        </p:nvSpPr>
+        <p:spPr>
+          <a:xfrm>
+            <a:off x="4993640" y="5236845"/>
+            <a:ext cx="85090" cy="1008380"/>
+          </a:xfrm>
+          <a:prstGeom prst="can">
+            <a:avLst/>
+          </a:prstGeom>
+        </p:spPr>
+        <p:style>
+          <a:lnRef idx="2">
+            <a:schemeClr val="accent1">
+              <a:shade val="50000"/>
+            </a:schemeClr>
+          </a:lnRef>
+          <a:fillRef idx="1">
+            <a:schemeClr val="accent1"/>
+          </a:fillRef>
+          <a:effectRef idx="0">
+            <a:schemeClr val="accent1"/>
+          </a:effectRef>
+          <a:fontRef idx="minor">
+            <a:schemeClr val="lt1"/>
+          </a:fontRef>
+        </p:style>
+        <p:txBody>
+          <a:bodyPr rtlCol="0" anchor="ctr"/>
+          <a:p>
+            <a:pPr algn="ctr"/>
+            <a:endParaRPr lang="zh-CN" altLang="en-US"/>
+          </a:p>
+        </p:txBody>
+      </p:sp>
+      <p:sp>
+        <p:nvSpPr>
           <p:cNvPr id="2" name="标题 1"/>
           <p:cNvSpPr>
             <a:spLocks noGrp="1"/>
@@ -4047,7 +4086,7 @@
         </p:nvGrpSpPr>
         <p:grpSpPr>
           <a:xfrm>
-            <a:off x="1400810" y="3833495"/>
+            <a:off x="1405255" y="5056505"/>
             <a:ext cx="1591310" cy="1186180"/>
             <a:chOff x="3313" y="6041"/>
             <a:chExt cx="2506" cy="1868"/>
@@ -4248,7 +4287,7 @@
         </p:nvCxnSpPr>
         <p:spPr>
           <a:xfrm flipV="1">
-            <a:off x="2324100" y="5012690"/>
+            <a:off x="2355850" y="6236970"/>
             <a:ext cx="2722880" cy="6985"/>
           </a:xfrm>
           <a:prstGeom prst="line">
@@ -4501,7 +4540,7 @@
         </p:nvSpPr>
         <p:spPr>
           <a:xfrm>
-            <a:off x="3320415" y="5040630"/>
+            <a:off x="3416300" y="5961380"/>
             <a:ext cx="384810" cy="275590"/>
           </a:xfrm>
           <a:prstGeom prst="rect">
@@ -4541,8 +4580,8 @@
           </p:nvPr>
         </p:nvGraphicFramePr>
         <p:xfrm>
-          <a:off x="7467600" y="4144010"/>
-          <a:ext cx="4018280" cy="2098675"/>
+          <a:off x="6670675" y="4166870"/>
+          <a:ext cx="4715510" cy="2098675"/>
         </p:xfrm>
         <a:graphic>
           <a:graphicData uri="http://schemas.openxmlformats.org/drawingml/2006/table">
@@ -4551,11 +4590,12 @@
                 <a:tableStyleId>{5C22544A-7EE6-4342-B048-85BDC9FD1C3A}</a:tableStyleId>
               </a:tblPr>
               <a:tblGrid>
-                <a:gridCol w="899160"/>
-                <a:gridCol w="824230"/>
-                <a:gridCol w="709930"/>
-                <a:gridCol w="765810"/>
-                <a:gridCol w="819150"/>
+                <a:gridCol w="746900"/>
+                <a:gridCol w="684658"/>
+                <a:gridCol w="589714"/>
+                <a:gridCol w="636131"/>
+                <a:gridCol w="680438"/>
+                <a:gridCol w="1377950"/>
               </a:tblGrid>
               <a:tr h="419735">
                 <a:tc>
@@ -4646,8 +4686,6 @@
                   </a:txBody>
                   <a:tcPr/>
                 </a:tc>
-              </a:tr>
-              <a:tr h="419735">
                 <a:tc>
                   <a:txBody>
                     <a:bodyPr/>
@@ -4656,74 +4694,16 @@
                         <a:buNone/>
                       </a:pPr>
                       <a:r>
-                        <a:rPr lang="en-US" altLang="zh-CN"/>
-                        <a:t>0</a:t>
+                        <a:rPr lang="en-US" altLang="zh-CN">
+                          <a:latin typeface="宋体" panose="02010600030101010101" pitchFamily="2" charset="-122"/>
+                          <a:ea typeface="宋体" panose="02010600030101010101" pitchFamily="2" charset="-122"/>
+                        </a:rPr>
+                        <a:t>offset</a:t>
                       </a:r>
-                      <a:endParaRPr lang="en-US" altLang="zh-CN"/>
-                    </a:p>
-                  </a:txBody>
-                  <a:tcPr/>
-                </a:tc>
-                <a:tc>
-                  <a:txBody>
-                    <a:bodyPr/>
-                    <a:p>
-                      <a:pPr>
-                        <a:buNone/>
-                      </a:pPr>
-                      <a:r>
-                        <a:rPr lang="en-US" altLang="zh-CN"/>
-                        <a:t>a0</a:t>
-                      </a:r>
-                      <a:endParaRPr lang="en-US" altLang="zh-CN"/>
-                    </a:p>
-                  </a:txBody>
-                  <a:tcPr/>
-                </a:tc>
-                <a:tc>
-                  <a:txBody>
-                    <a:bodyPr/>
-                    <a:p>
-                      <a:pPr>
-                        <a:buNone/>
-                      </a:pPr>
-                      <a:r>
-                        <a:rPr lang="en-US" altLang="zh-CN"/>
-                        <a:t>0</a:t>
-                      </a:r>
-                      <a:endParaRPr lang="en-US" altLang="zh-CN"/>
-                    </a:p>
-                  </a:txBody>
-                  <a:tcPr/>
-                </a:tc>
-                <a:tc>
-                  <a:txBody>
-                    <a:bodyPr/>
-                    <a:p>
-                      <a:pPr>
-                        <a:buNone/>
-                      </a:pPr>
-                      <a:r>
-                        <a:rPr lang="en-US" altLang="zh-CN"/>
-                        <a:t>0</a:t>
-                      </a:r>
-                      <a:endParaRPr lang="en-US" altLang="zh-CN"/>
-                    </a:p>
-                  </a:txBody>
-                  <a:tcPr/>
-                </a:tc>
-                <a:tc>
-                  <a:txBody>
-                    <a:bodyPr/>
-                    <a:p>
-                      <a:pPr>
-                        <a:buNone/>
-                      </a:pPr>
-                      <a:r>
-                        <a:rPr lang="en-US" altLang="zh-CN"/>
-                        <a:t>0</a:t>
-                      </a:r>
-                      <a:endParaRPr lang="en-US" altLang="zh-CN"/>
+                      <a:endParaRPr lang="en-US" altLang="zh-CN">
+                        <a:latin typeface="宋体" panose="02010600030101010101" pitchFamily="2" charset="-122"/>
+                        <a:ea typeface="宋体" panose="02010600030101010101" pitchFamily="2" charset="-122"/>
+                      </a:endParaRPr>
                     </a:p>
                   </a:txBody>
                   <a:tcPr/>
@@ -4787,7 +4767,7 @@
                       </a:pPr>
                       <a:r>
                         <a:rPr lang="en-US" altLang="zh-CN"/>
-                        <a:t>0</a:t>
+                        <a:t>L1</a:t>
                       </a:r>
                       <a:endParaRPr lang="en-US" altLang="zh-CN"/>
                     </a:p>
@@ -4807,6 +4787,28 @@
                           <a:ea typeface="宋体" panose="02010600030101010101" pitchFamily="2" charset="-122"/>
                         </a:rPr>
                         <a:t>θ</a:t>
+                      </a:r>
+                      <a:endParaRPr lang="en-US" altLang="zh-CN">
+                        <a:latin typeface="宋体" panose="02010600030101010101" pitchFamily="2" charset="-122"/>
+                        <a:ea typeface="宋体" panose="02010600030101010101" pitchFamily="2" charset="-122"/>
+                      </a:endParaRPr>
+                    </a:p>
+                  </a:txBody>
+                  <a:tcPr/>
+                </a:tc>
+                <a:tc>
+                  <a:txBody>
+                    <a:bodyPr/>
+                    <a:p>
+                      <a:pPr>
+                        <a:buNone/>
+                      </a:pPr>
+                      <a:r>
+                        <a:rPr lang="en-US" altLang="zh-CN">
+                          <a:latin typeface="宋体" panose="02010600030101010101" pitchFamily="2" charset="-122"/>
+                          <a:ea typeface="宋体" panose="02010600030101010101" pitchFamily="2" charset="-122"/>
+                        </a:rPr>
+                        <a:t>-0.19</a:t>
                       </a:r>
                       <a:endParaRPr lang="en-US" altLang="zh-CN">
                         <a:latin typeface="宋体" panose="02010600030101010101" pitchFamily="2" charset="-122"/>
@@ -4904,6 +4906,28 @@
                   </a:txBody>
                   <a:tcPr/>
                 </a:tc>
+                <a:tc>
+                  <a:txBody>
+                    <a:bodyPr/>
+                    <a:p>
+                      <a:pPr>
+                        <a:buNone/>
+                      </a:pPr>
+                      <a:r>
+                        <a:rPr lang="en-US" altLang="zh-CN">
+                          <a:latin typeface="宋体" panose="02010600030101010101" pitchFamily="2" charset="-122"/>
+                          <a:ea typeface="宋体" panose="02010600030101010101" pitchFamily="2" charset="-122"/>
+                        </a:rPr>
+                        <a:t>0.168</a:t>
+                      </a:r>
+                      <a:endParaRPr lang="en-US" altLang="zh-CN">
+                        <a:latin typeface="宋体" panose="02010600030101010101" pitchFamily="2" charset="-122"/>
+                        <a:ea typeface="宋体" panose="02010600030101010101" pitchFamily="2" charset="-122"/>
+                      </a:endParaRPr>
+                    </a:p>
+                  </a:txBody>
+                  <a:tcPr/>
+                </a:tc>
               </a:tr>
               <a:tr h="419735">
                 <a:tc>
@@ -4992,6 +5016,28 @@
                   </a:txBody>
                   <a:tcPr/>
                 </a:tc>
+                <a:tc>
+                  <a:txBody>
+                    <a:bodyPr/>
+                    <a:p>
+                      <a:pPr>
+                        <a:buNone/>
+                      </a:pPr>
+                      <a:r>
+                        <a:rPr lang="en-US" altLang="zh-CN">
+                          <a:latin typeface="宋体" panose="02010600030101010101" pitchFamily="2" charset="-122"/>
+                          <a:ea typeface="宋体" panose="02010600030101010101" pitchFamily="2" charset="-122"/>
+                        </a:rPr>
+                        <a:t>0</a:t>
+                      </a:r>
+                      <a:endParaRPr lang="en-US" altLang="zh-CN">
+                        <a:latin typeface="宋体" panose="02010600030101010101" pitchFamily="2" charset="-122"/>
+                        <a:ea typeface="宋体" panose="02010600030101010101" pitchFamily="2" charset="-122"/>
+                      </a:endParaRPr>
+                    </a:p>
+                  </a:txBody>
+                  <a:tcPr/>
+                </a:tc>
               </a:tr>
             </a:tbl>
           </a:graphicData>
@@ -5005,7 +5051,7 @@
         </p:nvSpPr>
         <p:spPr>
           <a:xfrm>
-            <a:off x="7729220" y="3118485"/>
+            <a:off x="7774940" y="3118485"/>
             <a:ext cx="384810" cy="275590"/>
           </a:xfrm>
           <a:prstGeom prst="rect">
@@ -5139,6 +5185,77 @@
           </a:fontRef>
         </p:style>
       </p:cxnSp>
+      <p:cxnSp>
+        <p:nvCxnSpPr>
+          <p:cNvPr id="5" name="直接箭头连接符 4"/>
+          <p:cNvCxnSpPr/>
+          <p:nvPr/>
+        </p:nvCxnSpPr>
+        <p:spPr>
+          <a:xfrm>
+            <a:off x="5222875" y="5001260"/>
+            <a:ext cx="26035" cy="1235075"/>
+          </a:xfrm>
+          <a:prstGeom prst="straightConnector1">
+            <a:avLst/>
+          </a:prstGeom>
+          <a:ln>
+            <a:headEnd type="arrow" w="med" len="med"/>
+            <a:tailEnd type="arrow" w="med" len="med"/>
+          </a:ln>
+        </p:spPr>
+        <p:style>
+          <a:lnRef idx="1">
+            <a:schemeClr val="accent3"/>
+          </a:lnRef>
+          <a:fillRef idx="0">
+            <a:schemeClr val="accent3"/>
+          </a:fillRef>
+          <a:effectRef idx="0">
+            <a:schemeClr val="accent3"/>
+          </a:effectRef>
+          <a:fontRef idx="minor">
+            <a:schemeClr val="tx1"/>
+          </a:fontRef>
+        </p:style>
+      </p:cxnSp>
+      <p:sp>
+        <p:nvSpPr>
+          <p:cNvPr id="6" name="文本框 5"/>
+          <p:cNvSpPr txBox="1"/>
+          <p:nvPr/>
+        </p:nvSpPr>
+        <p:spPr>
+          <a:xfrm>
+            <a:off x="5325745" y="5511800"/>
+            <a:ext cx="384810" cy="275590"/>
+          </a:xfrm>
+          <a:prstGeom prst="rect">
+            <a:avLst/>
+          </a:prstGeom>
+          <a:noFill/>
+        </p:spPr>
+        <p:txBody>
+          <a:bodyPr wrap="square" rtlCol="0">
+            <a:spAutoFit/>
+          </a:bodyPr>
+          <a:p>
+            <a:r>
+              <a:rPr lang="en-US" altLang="zh-CN" sz="1200">
+                <a:solidFill>
+                  <a:srgbClr val="FF0000"/>
+                </a:solidFill>
+              </a:rPr>
+              <a:t>L1</a:t>
+            </a:r>
+            <a:endParaRPr lang="en-US" altLang="zh-CN" sz="1200">
+              <a:solidFill>
+                <a:srgbClr val="FF0000"/>
+              </a:solidFill>
+            </a:endParaRPr>
+          </a:p>
+        </p:txBody>
+      </p:sp>
     </p:spTree>
     <p:custDataLst>
       <p:tags r:id="rId2"/>

</xml_diff>

<commit_message>
fix optimization issue added pic folder with pictures added draft report
</commit_message>
<xml_diff>
--- a/RobotArm.pptx
+++ b/RobotArm.pptx
@@ -10,6 +10,9 @@
     <p:sldId id="259" r:id="rId5"/>
     <p:sldId id="257" r:id="rId6"/>
     <p:sldId id="260" r:id="rId7"/>
+    <p:sldId id="262" r:id="rId8"/>
+    <p:sldId id="264" r:id="rId9"/>
+    <p:sldId id="263" r:id="rId10"/>
   </p:sldIdLst>
   <p:sldSz cx="12192000" cy="6858000"/>
   <p:notesSz cx="6858000" cy="9144000"/>
@@ -4580,8 +4583,8 @@
           </p:nvPr>
         </p:nvGraphicFramePr>
         <p:xfrm>
-          <a:off x="6670675" y="4166870"/>
-          <a:ext cx="4715510" cy="2098675"/>
+          <a:off x="7291705" y="4166870"/>
+          <a:ext cx="4715791" cy="1678940"/>
         </p:xfrm>
         <a:graphic>
           <a:graphicData uri="http://schemas.openxmlformats.org/drawingml/2006/table">
@@ -4590,12 +4593,12 @@
                 <a:tableStyleId>{5C22544A-7EE6-4342-B048-85BDC9FD1C3A}</a:tableStyleId>
               </a:tblPr>
               <a:tblGrid>
-                <a:gridCol w="746900"/>
-                <a:gridCol w="684658"/>
-                <a:gridCol w="589714"/>
-                <a:gridCol w="636131"/>
-                <a:gridCol w="680438"/>
-                <a:gridCol w="1377950"/>
+                <a:gridCol w="445135"/>
+                <a:gridCol w="609600"/>
+                <a:gridCol w="655320"/>
+                <a:gridCol w="580390"/>
+                <a:gridCol w="538480"/>
+                <a:gridCol w="1886866"/>
               </a:tblGrid>
               <a:tr h="419735">
                 <a:tc>
@@ -4788,7 +4791,14 @@
                         </a:rPr>
                         <a:t>θ</a:t>
                       </a:r>
-                      <a:endParaRPr lang="en-US" altLang="zh-CN">
+                      <a:r>
+                        <a:rPr lang="en-US" altLang="zh-CN" baseline="-25000">
+                          <a:latin typeface="宋体" panose="02010600030101010101" pitchFamily="2" charset="-122"/>
+                          <a:ea typeface="宋体" panose="02010600030101010101" pitchFamily="2" charset="-122"/>
+                        </a:rPr>
+                        <a:t>1</a:t>
+                      </a:r>
+                      <a:endParaRPr lang="en-US" altLang="zh-CN" baseline="-25000">
                         <a:latin typeface="宋体" panose="02010600030101010101" pitchFamily="2" charset="-122"/>
                         <a:ea typeface="宋体" panose="02010600030101010101" pitchFamily="2" charset="-122"/>
                       </a:endParaRPr>
@@ -4808,7 +4818,7 @@
                           <a:latin typeface="宋体" panose="02010600030101010101" pitchFamily="2" charset="-122"/>
                           <a:ea typeface="宋体" panose="02010600030101010101" pitchFamily="2" charset="-122"/>
                         </a:rPr>
-                        <a:t>-0.19</a:t>
+                        <a:t>-19º</a:t>
                       </a:r>
                       <a:endParaRPr lang="en-US" altLang="zh-CN">
                         <a:latin typeface="宋体" panose="02010600030101010101" pitchFamily="2" charset="-122"/>
@@ -4863,6 +4873,14 @@
                         <a:rPr lang="en-US" altLang="zh-CN"/>
                         <a:t>-90</a:t>
                       </a:r>
+                      <a:r>
+                        <a:rPr lang="en-US" altLang="zh-CN" sz="1800">
+                          <a:latin typeface="宋体" panose="02010600030101010101" pitchFamily="2" charset="-122"/>
+                          <a:ea typeface="宋体" panose="02010600030101010101" pitchFamily="2" charset="-122"/>
+                          <a:sym typeface="+mn-ea"/>
+                        </a:rPr>
+                        <a:t>º</a:t>
+                      </a:r>
                       <a:endParaRPr lang="en-US" altLang="zh-CN"/>
                     </a:p>
                   </a:txBody>
@@ -4898,7 +4916,14 @@
                         </a:rPr>
                         <a:t>θ</a:t>
                       </a:r>
-                      <a:endParaRPr lang="en-US" altLang="zh-CN">
+                      <a:r>
+                        <a:rPr lang="en-US" altLang="zh-CN" baseline="-25000">
+                          <a:latin typeface="宋体" panose="02010600030101010101" pitchFamily="2" charset="-122"/>
+                          <a:ea typeface="宋体" panose="02010600030101010101" pitchFamily="2" charset="-122"/>
+                        </a:rPr>
+                        <a:t>2</a:t>
+                      </a:r>
+                      <a:endParaRPr lang="en-US" altLang="zh-CN" baseline="-25000">
                         <a:latin typeface="宋体" panose="02010600030101010101" pitchFamily="2" charset="-122"/>
                         <a:ea typeface="宋体" panose="02010600030101010101" pitchFamily="2" charset="-122"/>
                       </a:endParaRPr>
@@ -4918,7 +4943,15 @@
                           <a:latin typeface="宋体" panose="02010600030101010101" pitchFamily="2" charset="-122"/>
                           <a:ea typeface="宋体" panose="02010600030101010101" pitchFamily="2" charset="-122"/>
                         </a:rPr>
-                        <a:t>0.168</a:t>
+                        <a:t>16.8</a:t>
+                      </a:r>
+                      <a:r>
+                        <a:rPr lang="en-US" altLang="zh-CN" sz="1800">
+                          <a:latin typeface="宋体" panose="02010600030101010101" pitchFamily="2" charset="-122"/>
+                          <a:ea typeface="宋体" panose="02010600030101010101" pitchFamily="2" charset="-122"/>
+                          <a:sym typeface="+mn-ea"/>
+                        </a:rPr>
+                        <a:t>º</a:t>
                       </a:r>
                       <a:endParaRPr lang="en-US" altLang="zh-CN">
                         <a:latin typeface="宋体" panose="02010600030101010101" pitchFamily="2" charset="-122"/>
@@ -5008,7 +5041,14 @@
                         </a:rPr>
                         <a:t>θ</a:t>
                       </a:r>
-                      <a:endParaRPr lang="zh-CN" altLang="en-US">
+                      <a:r>
+                        <a:rPr lang="en-US" altLang="zh-CN" baseline="-25000">
+                          <a:latin typeface="宋体" panose="02010600030101010101" pitchFamily="2" charset="-122"/>
+                          <a:ea typeface="宋体" panose="02010600030101010101" pitchFamily="2" charset="-122"/>
+                        </a:rPr>
+                        <a:t>3</a:t>
+                      </a:r>
+                      <a:endParaRPr lang="en-US" altLang="zh-CN" baseline="-25000">
                         <a:latin typeface="宋体" panose="02010600030101010101" pitchFamily="2" charset="-122"/>
                         <a:ea typeface="宋体" panose="02010600030101010101" pitchFamily="2" charset="-122"/>
                       </a:endParaRPr>
@@ -5335,6 +5375,2086 @@
 </p:sld>
 </file>
 
+<file path=ppt/slides/slide6.xml><?xml version="1.0" encoding="utf-8"?>
+<p:sld xmlns:a="http://schemas.openxmlformats.org/drawingml/2006/main" xmlns:r="http://schemas.openxmlformats.org/officeDocument/2006/relationships" xmlns:p="http://schemas.openxmlformats.org/presentationml/2006/main">
+  <p:cSld>
+    <p:spTree>
+      <p:nvGrpSpPr>
+        <p:cNvPr id="1" name=""/>
+        <p:cNvGrpSpPr/>
+        <p:nvPr/>
+      </p:nvGrpSpPr>
+      <p:grpSpPr/>
+      <p:sp>
+        <p:nvSpPr>
+          <p:cNvPr id="2" name="标题 1"/>
+          <p:cNvSpPr>
+            <a:spLocks noGrp="1"/>
+          </p:cNvSpPr>
+          <p:nvPr>
+            <p:ph type="title"/>
+          </p:nvPr>
+        </p:nvSpPr>
+        <p:spPr/>
+        <p:txBody>
+          <a:bodyPr/>
+          <a:p>
+            <a:r>
+              <a:rPr lang="en-US" altLang="zh-CN"/>
+              <a:t>Maximum reachable space</a:t>
+            </a:r>
+            <a:endParaRPr lang="en-US" altLang="zh-CN"/>
+          </a:p>
+        </p:txBody>
+      </p:sp>
+      <p:grpSp>
+        <p:nvGrpSpPr>
+          <p:cNvPr id="37" name="组合 36"/>
+          <p:cNvGrpSpPr/>
+          <p:nvPr/>
+        </p:nvGrpSpPr>
+        <p:grpSpPr>
+          <a:xfrm>
+            <a:off x="3381375" y="1853565"/>
+            <a:ext cx="5421630" cy="4949190"/>
+            <a:chOff x="6624" y="3920"/>
+            <a:chExt cx="8538" cy="7794"/>
+          </a:xfrm>
+        </p:grpSpPr>
+        <p:sp>
+          <p:nvSpPr>
+            <p:cNvPr id="15" name="饼形 14"/>
+            <p:cNvSpPr/>
+            <p:nvPr/>
+          </p:nvSpPr>
+          <p:spPr>
+            <a:xfrm rot="5400000">
+              <a:off x="6996" y="3548"/>
+              <a:ext cx="7794" cy="8539"/>
+            </a:xfrm>
+            <a:prstGeom prst="pie">
+              <a:avLst>
+                <a:gd name="adj1" fmla="val 5355248"/>
+                <a:gd name="adj2" fmla="val 17065503"/>
+              </a:avLst>
+            </a:prstGeom>
+            <a:solidFill>
+              <a:schemeClr val="accent5">
+                <a:alpha val="34000"/>
+              </a:schemeClr>
+            </a:solidFill>
+          </p:spPr>
+          <p:style>
+            <a:lnRef idx="3">
+              <a:schemeClr val="lt1"/>
+            </a:lnRef>
+            <a:fillRef idx="1">
+              <a:schemeClr val="accent5"/>
+            </a:fillRef>
+            <a:effectRef idx="1">
+              <a:schemeClr val="accent5"/>
+            </a:effectRef>
+            <a:fontRef idx="minor">
+              <a:schemeClr val="lt1"/>
+            </a:fontRef>
+          </p:style>
+          <p:txBody>
+            <a:bodyPr rtlCol="0" anchor="ctr"/>
+            <a:p>
+              <a:pPr algn="ctr"/>
+              <a:endParaRPr lang="zh-CN" altLang="en-US">
+                <a:solidFill>
+                  <a:schemeClr val="tx1"/>
+                </a:solidFill>
+              </a:endParaRPr>
+            </a:p>
+          </p:txBody>
+        </p:sp>
+        <p:sp>
+          <p:nvSpPr>
+            <p:cNvPr id="4" name="饼形 3"/>
+            <p:cNvSpPr/>
+            <p:nvPr/>
+          </p:nvSpPr>
+          <p:spPr>
+            <a:xfrm rot="5400000">
+              <a:off x="8454" y="5274"/>
+              <a:ext cx="4879" cy="5088"/>
+            </a:xfrm>
+            <a:prstGeom prst="pie">
+              <a:avLst>
+                <a:gd name="adj1" fmla="val 5361705"/>
+                <a:gd name="adj2" fmla="val 17066869"/>
+              </a:avLst>
+            </a:prstGeom>
+            <a:solidFill>
+              <a:schemeClr val="accent3">
+                <a:lumMod val="40000"/>
+                <a:lumOff val="60000"/>
+                <a:alpha val="52000"/>
+              </a:schemeClr>
+            </a:solidFill>
+          </p:spPr>
+          <p:style>
+            <a:lnRef idx="1">
+              <a:schemeClr val="accent3"/>
+            </a:lnRef>
+            <a:fillRef idx="2">
+              <a:schemeClr val="accent3"/>
+            </a:fillRef>
+            <a:effectRef idx="1">
+              <a:schemeClr val="accent3"/>
+            </a:effectRef>
+            <a:fontRef idx="minor">
+              <a:schemeClr val="dk1"/>
+            </a:fontRef>
+          </p:style>
+          <p:txBody>
+            <a:bodyPr rtlCol="0" anchor="ctr"/>
+            <a:p>
+              <a:pPr algn="ctr"/>
+              <a:endParaRPr lang="zh-CN" altLang="en-US">
+                <a:solidFill>
+                  <a:schemeClr val="tx1"/>
+                </a:solidFill>
+              </a:endParaRPr>
+            </a:p>
+          </p:txBody>
+        </p:sp>
+        <p:cxnSp>
+          <p:nvCxnSpPr>
+            <p:cNvPr id="16" name="直接箭头连接符 15"/>
+            <p:cNvCxnSpPr/>
+            <p:nvPr/>
+          </p:nvCxnSpPr>
+          <p:spPr>
+            <a:xfrm flipH="1" flipV="1">
+              <a:off x="9896" y="5628"/>
+              <a:ext cx="1003" cy="2192"/>
+            </a:xfrm>
+            <a:prstGeom prst="straightConnector1">
+              <a:avLst/>
+            </a:prstGeom>
+            <a:ln>
+              <a:tailEnd type="arrow" w="med" len="med"/>
+            </a:ln>
+          </p:spPr>
+          <p:style>
+            <a:lnRef idx="2">
+              <a:schemeClr val="accent3"/>
+            </a:lnRef>
+            <a:fillRef idx="0">
+              <a:schemeClr val="accent3"/>
+            </a:fillRef>
+            <a:effectRef idx="1">
+              <a:schemeClr val="accent3"/>
+            </a:effectRef>
+            <a:fontRef idx="minor">
+              <a:schemeClr val="tx1"/>
+            </a:fontRef>
+          </p:style>
+        </p:cxnSp>
+        <p:sp>
+          <p:nvSpPr>
+            <p:cNvPr id="17" name="文本框 16"/>
+            <p:cNvSpPr txBox="1"/>
+            <p:nvPr/>
+          </p:nvSpPr>
+          <p:spPr>
+            <a:xfrm>
+              <a:off x="9370" y="6433"/>
+              <a:ext cx="2106" cy="580"/>
+            </a:xfrm>
+            <a:prstGeom prst="rect">
+              <a:avLst/>
+            </a:prstGeom>
+            <a:noFill/>
+          </p:spPr>
+          <p:txBody>
+            <a:bodyPr wrap="square" rtlCol="0">
+              <a:spAutoFit/>
+            </a:bodyPr>
+            <a:p>
+              <a:r>
+                <a:rPr lang="en-US" altLang="zh-CN"/>
+                <a:t>r=a1</a:t>
+              </a:r>
+              <a:endParaRPr lang="en-US" altLang="zh-CN"/>
+            </a:p>
+          </p:txBody>
+        </p:sp>
+        <p:sp>
+          <p:nvSpPr>
+            <p:cNvPr id="18" name="文本框 17"/>
+            <p:cNvSpPr txBox="1"/>
+            <p:nvPr/>
+          </p:nvSpPr>
+          <p:spPr>
+            <a:xfrm>
+              <a:off x="8783" y="4799"/>
+              <a:ext cx="2106" cy="580"/>
+            </a:xfrm>
+            <a:prstGeom prst="rect">
+              <a:avLst/>
+            </a:prstGeom>
+            <a:noFill/>
+          </p:spPr>
+          <p:txBody>
+            <a:bodyPr wrap="square" rtlCol="0">
+              <a:spAutoFit/>
+            </a:bodyPr>
+            <a:p>
+              <a:r>
+                <a:rPr lang="en-US" altLang="zh-CN"/>
+                <a:t>r=a2</a:t>
+              </a:r>
+              <a:endParaRPr lang="en-US" altLang="zh-CN"/>
+            </a:p>
+          </p:txBody>
+        </p:sp>
+        <p:cxnSp>
+          <p:nvCxnSpPr>
+            <p:cNvPr id="26" name="直接箭头连接符 25"/>
+            <p:cNvCxnSpPr/>
+            <p:nvPr/>
+          </p:nvCxnSpPr>
+          <p:spPr>
+            <a:xfrm flipH="1" flipV="1">
+              <a:off x="9275" y="4306"/>
+              <a:ext cx="621" cy="1273"/>
+            </a:xfrm>
+            <a:prstGeom prst="straightConnector1">
+              <a:avLst/>
+            </a:prstGeom>
+            <a:ln>
+              <a:tailEnd type="arrow" w="med" len="med"/>
+            </a:ln>
+          </p:spPr>
+          <p:style>
+            <a:lnRef idx="3">
+              <a:schemeClr val="accent1"/>
+            </a:lnRef>
+            <a:fillRef idx="0">
+              <a:schemeClr val="accent1"/>
+            </a:fillRef>
+            <a:effectRef idx="2">
+              <a:schemeClr val="accent1"/>
+            </a:effectRef>
+            <a:fontRef idx="minor">
+              <a:schemeClr val="tx1"/>
+            </a:fontRef>
+          </p:style>
+        </p:cxnSp>
+      </p:grpSp>
+      <p:grpSp>
+        <p:nvGrpSpPr>
+          <p:cNvPr id="36" name="组合 35"/>
+          <p:cNvGrpSpPr/>
+          <p:nvPr/>
+        </p:nvGrpSpPr>
+        <p:grpSpPr>
+          <a:xfrm>
+            <a:off x="894715" y="1853565"/>
+            <a:ext cx="1751965" cy="4015740"/>
+            <a:chOff x="1409" y="2919"/>
+            <a:chExt cx="2759" cy="6324"/>
+          </a:xfrm>
+        </p:grpSpPr>
+        <p:sp>
+          <p:nvSpPr>
+            <p:cNvPr id="21" name="椭圆 20"/>
+            <p:cNvSpPr/>
+            <p:nvPr/>
+          </p:nvSpPr>
+          <p:spPr>
+            <a:xfrm>
+              <a:off x="2855" y="8513"/>
+              <a:ext cx="662" cy="730"/>
+            </a:xfrm>
+            <a:prstGeom prst="ellipse">
+              <a:avLst/>
+            </a:prstGeom>
+            <a:solidFill>
+              <a:schemeClr val="accent3">
+                <a:alpha val="44000"/>
+              </a:schemeClr>
+            </a:solidFill>
+          </p:spPr>
+          <p:style>
+            <a:lnRef idx="2">
+              <a:schemeClr val="accent3">
+                <a:shade val="50000"/>
+              </a:schemeClr>
+            </a:lnRef>
+            <a:fillRef idx="1">
+              <a:schemeClr val="accent3"/>
+            </a:fillRef>
+            <a:effectRef idx="0">
+              <a:schemeClr val="accent3"/>
+            </a:effectRef>
+            <a:fontRef idx="minor">
+              <a:schemeClr val="lt1"/>
+            </a:fontRef>
+          </p:style>
+          <p:txBody>
+            <a:bodyPr rtlCol="0" anchor="ctr"/>
+            <a:p>
+              <a:pPr algn="ctr"/>
+              <a:endParaRPr lang="zh-CN" altLang="en-US"/>
+            </a:p>
+          </p:txBody>
+        </p:sp>
+        <p:sp>
+          <p:nvSpPr>
+            <p:cNvPr id="22" name="椭圆 21"/>
+            <p:cNvSpPr/>
+            <p:nvPr/>
+          </p:nvSpPr>
+          <p:spPr>
+            <a:xfrm>
+              <a:off x="2855" y="5395"/>
+              <a:ext cx="662" cy="730"/>
+            </a:xfrm>
+            <a:prstGeom prst="ellipse">
+              <a:avLst/>
+            </a:prstGeom>
+            <a:solidFill>
+              <a:schemeClr val="accent2">
+                <a:alpha val="54000"/>
+              </a:schemeClr>
+            </a:solidFill>
+          </p:spPr>
+          <p:style>
+            <a:lnRef idx="2">
+              <a:schemeClr val="accent2">
+                <a:shade val="50000"/>
+              </a:schemeClr>
+            </a:lnRef>
+            <a:fillRef idx="1">
+              <a:schemeClr val="accent2"/>
+            </a:fillRef>
+            <a:effectRef idx="0">
+              <a:schemeClr val="accent2"/>
+            </a:effectRef>
+            <a:fontRef idx="minor">
+              <a:schemeClr val="lt1"/>
+            </a:fontRef>
+          </p:style>
+          <p:txBody>
+            <a:bodyPr rtlCol="0" anchor="ctr"/>
+            <a:p>
+              <a:pPr algn="ctr"/>
+              <a:endParaRPr lang="zh-CN" altLang="en-US"/>
+            </a:p>
+          </p:txBody>
+        </p:sp>
+        <p:sp>
+          <p:nvSpPr>
+            <p:cNvPr id="24" name="圆柱形 23"/>
+            <p:cNvSpPr/>
+            <p:nvPr/>
+          </p:nvSpPr>
+          <p:spPr>
+            <a:xfrm rot="16200000">
+              <a:off x="2812" y="2979"/>
+              <a:ext cx="764" cy="645"/>
+            </a:xfrm>
+            <a:prstGeom prst="can">
+              <a:avLst/>
+            </a:prstGeom>
+            <a:solidFill>
+              <a:schemeClr val="accent5">
+                <a:alpha val="31000"/>
+              </a:schemeClr>
+            </a:solidFill>
+          </p:spPr>
+          <p:style>
+            <a:lnRef idx="3">
+              <a:schemeClr val="lt1"/>
+            </a:lnRef>
+            <a:fillRef idx="1">
+              <a:schemeClr val="accent5"/>
+            </a:fillRef>
+            <a:effectRef idx="1">
+              <a:schemeClr val="accent5"/>
+            </a:effectRef>
+            <a:fontRef idx="minor">
+              <a:schemeClr val="lt1"/>
+            </a:fontRef>
+          </p:style>
+          <p:txBody>
+            <a:bodyPr rtlCol="0" anchor="ctr"/>
+            <a:p>
+              <a:pPr algn="ctr"/>
+              <a:endParaRPr lang="zh-CN" altLang="en-US"/>
+            </a:p>
+          </p:txBody>
+        </p:sp>
+        <p:cxnSp>
+          <p:nvCxnSpPr>
+            <p:cNvPr id="25" name="直接箭头连接符 24"/>
+            <p:cNvCxnSpPr/>
+            <p:nvPr/>
+          </p:nvCxnSpPr>
+          <p:spPr>
+            <a:xfrm flipV="1">
+              <a:off x="3178" y="5695"/>
+              <a:ext cx="0" cy="3192"/>
+            </a:xfrm>
+            <a:prstGeom prst="straightConnector1">
+              <a:avLst/>
+            </a:prstGeom>
+            <a:ln>
+              <a:tailEnd type="arrow" w="med" len="med"/>
+            </a:ln>
+          </p:spPr>
+          <p:style>
+            <a:lnRef idx="2">
+              <a:schemeClr val="accent3"/>
+            </a:lnRef>
+            <a:fillRef idx="0">
+              <a:schemeClr val="accent3"/>
+            </a:fillRef>
+            <a:effectRef idx="1">
+              <a:schemeClr val="accent3"/>
+            </a:effectRef>
+            <a:fontRef idx="minor">
+              <a:schemeClr val="tx1"/>
+            </a:fontRef>
+          </p:style>
+        </p:cxnSp>
+        <p:cxnSp>
+          <p:nvCxnSpPr>
+            <p:cNvPr id="28" name="直接箭头连接符 27"/>
+            <p:cNvCxnSpPr/>
+            <p:nvPr/>
+          </p:nvCxnSpPr>
+          <p:spPr>
+            <a:xfrm flipV="1">
+              <a:off x="3195" y="3352"/>
+              <a:ext cx="0" cy="2394"/>
+            </a:xfrm>
+            <a:prstGeom prst="straightConnector1">
+              <a:avLst/>
+            </a:prstGeom>
+            <a:ln>
+              <a:tailEnd type="arrow"/>
+            </a:ln>
+          </p:spPr>
+          <p:style>
+            <a:lnRef idx="1">
+              <a:schemeClr val="accent1"/>
+            </a:lnRef>
+            <a:fillRef idx="0">
+              <a:schemeClr val="accent1"/>
+            </a:fillRef>
+            <a:effectRef idx="0">
+              <a:schemeClr val="accent1"/>
+            </a:effectRef>
+            <a:fontRef idx="minor">
+              <a:schemeClr val="tx1"/>
+            </a:fontRef>
+          </p:style>
+        </p:cxnSp>
+        <p:sp>
+          <p:nvSpPr>
+            <p:cNvPr id="31" name="文本框 30"/>
+            <p:cNvSpPr txBox="1"/>
+            <p:nvPr/>
+          </p:nvSpPr>
+          <p:spPr>
+            <a:xfrm>
+              <a:off x="3195" y="6752"/>
+              <a:ext cx="849" cy="580"/>
+            </a:xfrm>
+            <a:prstGeom prst="rect">
+              <a:avLst/>
+            </a:prstGeom>
+            <a:noFill/>
+          </p:spPr>
+          <p:txBody>
+            <a:bodyPr wrap="square" rtlCol="0">
+              <a:spAutoFit/>
+            </a:bodyPr>
+            <a:p>
+              <a:r>
+                <a:rPr lang="en-US" altLang="zh-CN"/>
+                <a:t>a1</a:t>
+              </a:r>
+              <a:endParaRPr lang="en-US" altLang="zh-CN"/>
+            </a:p>
+          </p:txBody>
+        </p:sp>
+        <p:sp>
+          <p:nvSpPr>
+            <p:cNvPr id="32" name="文本框 31"/>
+            <p:cNvSpPr txBox="1"/>
+            <p:nvPr/>
+          </p:nvSpPr>
+          <p:spPr>
+            <a:xfrm>
+              <a:off x="3336" y="4188"/>
+              <a:ext cx="833" cy="580"/>
+            </a:xfrm>
+            <a:prstGeom prst="rect">
+              <a:avLst/>
+            </a:prstGeom>
+            <a:noFill/>
+          </p:spPr>
+          <p:txBody>
+            <a:bodyPr wrap="square" rtlCol="0">
+              <a:spAutoFit/>
+            </a:bodyPr>
+            <a:p>
+              <a:r>
+                <a:rPr lang="en-US" altLang="zh-CN"/>
+                <a:t>a2</a:t>
+              </a:r>
+              <a:endParaRPr lang="en-US" altLang="zh-CN"/>
+            </a:p>
+          </p:txBody>
+        </p:sp>
+        <p:sp>
+          <p:nvSpPr>
+            <p:cNvPr id="33" name="文本框 32"/>
+            <p:cNvSpPr txBox="1"/>
+            <p:nvPr/>
+          </p:nvSpPr>
+          <p:spPr>
+            <a:xfrm>
+              <a:off x="1555" y="8588"/>
+              <a:ext cx="1317" cy="580"/>
+            </a:xfrm>
+            <a:prstGeom prst="rect">
+              <a:avLst/>
+            </a:prstGeom>
+            <a:noFill/>
+          </p:spPr>
+          <p:txBody>
+            <a:bodyPr wrap="square" rtlCol="0">
+              <a:spAutoFit/>
+            </a:bodyPr>
+            <a:p>
+              <a:r>
+                <a:rPr lang="en-US" altLang="zh-CN"/>
+                <a:t>Joint1</a:t>
+              </a:r>
+              <a:endParaRPr lang="en-US" altLang="zh-CN"/>
+            </a:p>
+          </p:txBody>
+        </p:sp>
+        <p:sp>
+          <p:nvSpPr>
+            <p:cNvPr id="34" name="文本框 33"/>
+            <p:cNvSpPr txBox="1"/>
+            <p:nvPr/>
+          </p:nvSpPr>
+          <p:spPr>
+            <a:xfrm>
+              <a:off x="1409" y="5395"/>
+              <a:ext cx="1317" cy="580"/>
+            </a:xfrm>
+            <a:prstGeom prst="rect">
+              <a:avLst/>
+            </a:prstGeom>
+            <a:noFill/>
+          </p:spPr>
+          <p:txBody>
+            <a:bodyPr wrap="square" rtlCol="0">
+              <a:spAutoFit/>
+            </a:bodyPr>
+            <a:p>
+              <a:r>
+                <a:rPr lang="en-US" altLang="zh-CN"/>
+                <a:t>Joint2</a:t>
+              </a:r>
+              <a:endParaRPr lang="en-US" altLang="zh-CN"/>
+            </a:p>
+          </p:txBody>
+        </p:sp>
+        <p:sp>
+          <p:nvSpPr>
+            <p:cNvPr id="35" name="文本框 34"/>
+            <p:cNvSpPr txBox="1"/>
+            <p:nvPr/>
+          </p:nvSpPr>
+          <p:spPr>
+            <a:xfrm>
+              <a:off x="1439" y="3012"/>
+              <a:ext cx="1317" cy="580"/>
+            </a:xfrm>
+            <a:prstGeom prst="rect">
+              <a:avLst/>
+            </a:prstGeom>
+            <a:noFill/>
+          </p:spPr>
+          <p:txBody>
+            <a:bodyPr wrap="square" rtlCol="0">
+              <a:spAutoFit/>
+            </a:bodyPr>
+            <a:p>
+              <a:r>
+                <a:rPr lang="en-US" altLang="zh-CN"/>
+                <a:t>Joint3</a:t>
+              </a:r>
+              <a:endParaRPr lang="en-US" altLang="zh-CN"/>
+            </a:p>
+          </p:txBody>
+        </p:sp>
+      </p:grpSp>
+    </p:spTree>
+    <p:custDataLst>
+      <p:tags r:id="rId1"/>
+    </p:custDataLst>
+  </p:cSld>
+  <p:clrMapOvr>
+    <a:masterClrMapping/>
+  </p:clrMapOvr>
+</p:sld>
+</file>
+
+<file path=ppt/slides/slide7.xml><?xml version="1.0" encoding="utf-8"?>
+<p:sld xmlns:a="http://schemas.openxmlformats.org/drawingml/2006/main" xmlns:r="http://schemas.openxmlformats.org/officeDocument/2006/relationships" xmlns:p="http://schemas.openxmlformats.org/presentationml/2006/main">
+  <p:cSld>
+    <p:spTree>
+      <p:nvGrpSpPr>
+        <p:cNvPr id="1" name=""/>
+        <p:cNvGrpSpPr/>
+        <p:nvPr/>
+      </p:nvGrpSpPr>
+      <p:grpSpPr/>
+      <p:sp>
+        <p:nvSpPr>
+          <p:cNvPr id="2" name="标题 1"/>
+          <p:cNvSpPr>
+            <a:spLocks noGrp="1"/>
+          </p:cNvSpPr>
+          <p:nvPr>
+            <p:ph type="title"/>
+          </p:nvPr>
+        </p:nvSpPr>
+        <p:spPr/>
+        <p:txBody>
+          <a:bodyPr/>
+          <a:p>
+            <a:r>
+              <a:rPr lang="en-US" altLang="zh-CN"/>
+              <a:t>Minimum reachable space</a:t>
+            </a:r>
+            <a:endParaRPr lang="en-US" altLang="zh-CN"/>
+          </a:p>
+        </p:txBody>
+      </p:sp>
+      <p:grpSp>
+        <p:nvGrpSpPr>
+          <p:cNvPr id="7" name="组合 6"/>
+          <p:cNvGrpSpPr/>
+          <p:nvPr/>
+        </p:nvGrpSpPr>
+        <p:grpSpPr>
+          <a:xfrm>
+            <a:off x="4841875" y="1791970"/>
+            <a:ext cx="3230880" cy="3097530"/>
+            <a:chOff x="11125" y="4882"/>
+            <a:chExt cx="5088" cy="4878"/>
+          </a:xfrm>
+        </p:grpSpPr>
+        <p:sp>
+          <p:nvSpPr>
+            <p:cNvPr id="4" name="饼形 3"/>
+            <p:cNvSpPr/>
+            <p:nvPr/>
+          </p:nvSpPr>
+          <p:spPr>
+            <a:xfrm rot="5400000">
+              <a:off x="11230" y="4777"/>
+              <a:ext cx="4879" cy="5088"/>
+            </a:xfrm>
+            <a:prstGeom prst="pie">
+              <a:avLst>
+                <a:gd name="adj1" fmla="val 5361705"/>
+                <a:gd name="adj2" fmla="val 17066869"/>
+              </a:avLst>
+            </a:prstGeom>
+            <a:solidFill>
+              <a:schemeClr val="accent3">
+                <a:lumMod val="40000"/>
+                <a:lumOff val="60000"/>
+                <a:alpha val="52000"/>
+              </a:schemeClr>
+            </a:solidFill>
+          </p:spPr>
+          <p:style>
+            <a:lnRef idx="1">
+              <a:schemeClr val="accent3"/>
+            </a:lnRef>
+            <a:fillRef idx="2">
+              <a:schemeClr val="accent3"/>
+            </a:fillRef>
+            <a:effectRef idx="1">
+              <a:schemeClr val="accent3"/>
+            </a:effectRef>
+            <a:fontRef idx="minor">
+              <a:schemeClr val="dk1"/>
+            </a:fontRef>
+          </p:style>
+          <p:txBody>
+            <a:bodyPr rtlCol="0" anchor="ctr"/>
+            <a:p>
+              <a:pPr algn="ctr"/>
+              <a:endParaRPr lang="zh-CN" altLang="en-US">
+                <a:solidFill>
+                  <a:schemeClr val="tx1"/>
+                </a:solidFill>
+              </a:endParaRPr>
+            </a:p>
+          </p:txBody>
+        </p:sp>
+        <p:grpSp>
+          <p:nvGrpSpPr>
+            <p:cNvPr id="6" name="组合 5"/>
+            <p:cNvGrpSpPr/>
+            <p:nvPr/>
+          </p:nvGrpSpPr>
+          <p:grpSpPr>
+            <a:xfrm>
+              <a:off x="12146" y="5131"/>
+              <a:ext cx="3678" cy="3103"/>
+              <a:chOff x="12146" y="5131"/>
+              <a:chExt cx="3678" cy="3103"/>
+            </a:xfrm>
+          </p:grpSpPr>
+          <p:sp>
+            <p:nvSpPr>
+              <p:cNvPr id="15" name="饼形 14"/>
+              <p:cNvSpPr/>
+              <p:nvPr/>
+            </p:nvSpPr>
+            <p:spPr>
+              <a:xfrm rot="2940000">
+                <a:off x="12756" y="6459"/>
+                <a:ext cx="1827" cy="1725"/>
+              </a:xfrm>
+              <a:prstGeom prst="pie">
+                <a:avLst>
+                  <a:gd name="adj1" fmla="val 5355248"/>
+                  <a:gd name="adj2" fmla="val 17065503"/>
+                </a:avLst>
+              </a:prstGeom>
+              <a:solidFill>
+                <a:schemeClr val="accent5">
+                  <a:alpha val="34000"/>
+                </a:schemeClr>
+              </a:solidFill>
+            </p:spPr>
+            <p:style>
+              <a:lnRef idx="3">
+                <a:schemeClr val="lt1"/>
+              </a:lnRef>
+              <a:fillRef idx="1">
+                <a:schemeClr val="accent5"/>
+              </a:fillRef>
+              <a:effectRef idx="1">
+                <a:schemeClr val="accent5"/>
+              </a:effectRef>
+              <a:fontRef idx="minor">
+                <a:schemeClr val="lt1"/>
+              </a:fontRef>
+            </p:style>
+            <p:txBody>
+              <a:bodyPr rtlCol="0" anchor="ctr"/>
+              <a:p>
+                <a:pPr algn="ctr"/>
+                <a:endParaRPr lang="zh-CN" altLang="en-US">
+                  <a:solidFill>
+                    <a:schemeClr val="tx1"/>
+                  </a:solidFill>
+                </a:endParaRPr>
+              </a:p>
+            </p:txBody>
+          </p:sp>
+          <p:cxnSp>
+            <p:nvCxnSpPr>
+              <p:cNvPr id="16" name="直接箭头连接符 15"/>
+              <p:cNvCxnSpPr/>
+              <p:nvPr/>
+            </p:nvCxnSpPr>
+            <p:spPr>
+              <a:xfrm flipH="1" flipV="1">
+                <a:off x="12672" y="5131"/>
+                <a:ext cx="1003" cy="2192"/>
+              </a:xfrm>
+              <a:prstGeom prst="straightConnector1">
+                <a:avLst/>
+              </a:prstGeom>
+              <a:ln>
+                <a:tailEnd type="arrow" w="med" len="med"/>
+              </a:ln>
+            </p:spPr>
+            <p:style>
+              <a:lnRef idx="2">
+                <a:schemeClr val="accent3"/>
+              </a:lnRef>
+              <a:fillRef idx="0">
+                <a:schemeClr val="accent3"/>
+              </a:fillRef>
+              <a:effectRef idx="1">
+                <a:schemeClr val="accent3"/>
+              </a:effectRef>
+              <a:fontRef idx="minor">
+                <a:schemeClr val="tx1"/>
+              </a:fontRef>
+            </p:style>
+          </p:cxnSp>
+          <p:sp>
+            <p:nvSpPr>
+              <p:cNvPr id="17" name="文本框 16"/>
+              <p:cNvSpPr txBox="1"/>
+              <p:nvPr/>
+            </p:nvSpPr>
+            <p:spPr>
+              <a:xfrm>
+                <a:off x="12146" y="5936"/>
+                <a:ext cx="2106" cy="580"/>
+              </a:xfrm>
+              <a:prstGeom prst="rect">
+                <a:avLst/>
+              </a:prstGeom>
+              <a:noFill/>
+            </p:spPr>
+            <p:txBody>
+              <a:bodyPr wrap="square" rtlCol="0">
+                <a:spAutoFit/>
+              </a:bodyPr>
+              <a:p>
+                <a:r>
+                  <a:rPr lang="en-US" altLang="zh-CN"/>
+                  <a:t>r=a1</a:t>
+                </a:r>
+                <a:endParaRPr lang="en-US" altLang="zh-CN"/>
+              </a:p>
+            </p:txBody>
+          </p:sp>
+          <p:sp>
+            <p:nvSpPr>
+              <p:cNvPr id="18" name="文本框 17"/>
+              <p:cNvSpPr txBox="1"/>
+              <p:nvPr/>
+            </p:nvSpPr>
+            <p:spPr>
+              <a:xfrm>
+                <a:off x="13718" y="6484"/>
+                <a:ext cx="2106" cy="580"/>
+              </a:xfrm>
+              <a:prstGeom prst="rect">
+                <a:avLst/>
+              </a:prstGeom>
+              <a:noFill/>
+            </p:spPr>
+            <p:txBody>
+              <a:bodyPr wrap="square" rtlCol="0">
+                <a:spAutoFit/>
+              </a:bodyPr>
+              <a:p>
+                <a:r>
+                  <a:rPr lang="en-US" altLang="zh-CN"/>
+                  <a:t>r=a1-a2</a:t>
+                </a:r>
+                <a:endParaRPr lang="en-US" altLang="zh-CN"/>
+              </a:p>
+            </p:txBody>
+          </p:sp>
+          <p:cxnSp>
+            <p:nvCxnSpPr>
+              <p:cNvPr id="26" name="直接箭头连接符 25"/>
+              <p:cNvCxnSpPr/>
+              <p:nvPr/>
+            </p:nvCxnSpPr>
+            <p:spPr>
+              <a:xfrm flipH="1" flipV="1">
+                <a:off x="13681" y="6484"/>
+                <a:ext cx="31" cy="818"/>
+              </a:xfrm>
+              <a:prstGeom prst="straightConnector1">
+                <a:avLst/>
+              </a:prstGeom>
+              <a:ln>
+                <a:tailEnd type="arrow" w="med" len="med"/>
+              </a:ln>
+            </p:spPr>
+            <p:style>
+              <a:lnRef idx="3">
+                <a:schemeClr val="accent1"/>
+              </a:lnRef>
+              <a:fillRef idx="0">
+                <a:schemeClr val="accent1"/>
+              </a:fillRef>
+              <a:effectRef idx="2">
+                <a:schemeClr val="accent1"/>
+              </a:effectRef>
+              <a:fontRef idx="minor">
+                <a:schemeClr val="tx1"/>
+              </a:fontRef>
+            </p:style>
+          </p:cxnSp>
+        </p:grpSp>
+      </p:grpSp>
+      <p:grpSp>
+        <p:nvGrpSpPr>
+          <p:cNvPr id="5" name="组合 4"/>
+          <p:cNvGrpSpPr/>
+          <p:nvPr/>
+        </p:nvGrpSpPr>
+        <p:grpSpPr>
+          <a:xfrm>
+            <a:off x="2049145" y="2087245"/>
+            <a:ext cx="1951355" cy="2790825"/>
+            <a:chOff x="3076" y="5832"/>
+            <a:chExt cx="3073" cy="4395"/>
+          </a:xfrm>
+        </p:grpSpPr>
+        <p:sp>
+          <p:nvSpPr>
+            <p:cNvPr id="21" name="椭圆 20"/>
+            <p:cNvSpPr/>
+            <p:nvPr/>
+          </p:nvSpPr>
+          <p:spPr>
+            <a:xfrm>
+              <a:off x="4961" y="8950"/>
+              <a:ext cx="662" cy="730"/>
+            </a:xfrm>
+            <a:prstGeom prst="ellipse">
+              <a:avLst/>
+            </a:prstGeom>
+            <a:solidFill>
+              <a:schemeClr val="accent3">
+                <a:alpha val="44000"/>
+              </a:schemeClr>
+            </a:solidFill>
+          </p:spPr>
+          <p:style>
+            <a:lnRef idx="2">
+              <a:schemeClr val="accent3">
+                <a:shade val="50000"/>
+              </a:schemeClr>
+            </a:lnRef>
+            <a:fillRef idx="1">
+              <a:schemeClr val="accent3"/>
+            </a:fillRef>
+            <a:effectRef idx="0">
+              <a:schemeClr val="accent3"/>
+            </a:effectRef>
+            <a:fontRef idx="minor">
+              <a:schemeClr val="lt1"/>
+            </a:fontRef>
+          </p:style>
+          <p:txBody>
+            <a:bodyPr rtlCol="0" anchor="ctr"/>
+            <a:p>
+              <a:pPr algn="ctr"/>
+              <a:endParaRPr lang="zh-CN" altLang="en-US"/>
+            </a:p>
+          </p:txBody>
+        </p:sp>
+        <p:sp>
+          <p:nvSpPr>
+            <p:cNvPr id="22" name="椭圆 21"/>
+            <p:cNvSpPr/>
+            <p:nvPr/>
+          </p:nvSpPr>
+          <p:spPr>
+            <a:xfrm>
+              <a:off x="4961" y="5832"/>
+              <a:ext cx="662" cy="730"/>
+            </a:xfrm>
+            <a:prstGeom prst="ellipse">
+              <a:avLst/>
+            </a:prstGeom>
+            <a:solidFill>
+              <a:schemeClr val="accent2">
+                <a:alpha val="54000"/>
+              </a:schemeClr>
+            </a:solidFill>
+          </p:spPr>
+          <p:style>
+            <a:lnRef idx="2">
+              <a:schemeClr val="accent2">
+                <a:shade val="50000"/>
+              </a:schemeClr>
+            </a:lnRef>
+            <a:fillRef idx="1">
+              <a:schemeClr val="accent2"/>
+            </a:fillRef>
+            <a:effectRef idx="0">
+              <a:schemeClr val="accent2"/>
+            </a:effectRef>
+            <a:fontRef idx="minor">
+              <a:schemeClr val="lt1"/>
+            </a:fontRef>
+          </p:style>
+          <p:txBody>
+            <a:bodyPr rtlCol="0" anchor="ctr"/>
+            <a:p>
+              <a:pPr algn="ctr"/>
+              <a:endParaRPr lang="zh-CN" altLang="en-US"/>
+            </a:p>
+          </p:txBody>
+        </p:sp>
+        <p:sp>
+          <p:nvSpPr>
+            <p:cNvPr id="24" name="圆柱形 23"/>
+            <p:cNvSpPr/>
+            <p:nvPr/>
+          </p:nvSpPr>
+          <p:spPr>
+            <a:xfrm rot="16200000">
+              <a:off x="4562" y="8223"/>
+              <a:ext cx="764" cy="645"/>
+            </a:xfrm>
+            <a:prstGeom prst="can">
+              <a:avLst/>
+            </a:prstGeom>
+            <a:solidFill>
+              <a:schemeClr val="accent5">
+                <a:alpha val="31000"/>
+              </a:schemeClr>
+            </a:solidFill>
+          </p:spPr>
+          <p:style>
+            <a:lnRef idx="3">
+              <a:schemeClr val="lt1"/>
+            </a:lnRef>
+            <a:fillRef idx="1">
+              <a:schemeClr val="accent5"/>
+            </a:fillRef>
+            <a:effectRef idx="1">
+              <a:schemeClr val="accent5"/>
+            </a:effectRef>
+            <a:fontRef idx="minor">
+              <a:schemeClr val="lt1"/>
+            </a:fontRef>
+          </p:style>
+          <p:txBody>
+            <a:bodyPr rtlCol="0" anchor="ctr"/>
+            <a:p>
+              <a:pPr algn="ctr"/>
+              <a:endParaRPr lang="zh-CN" altLang="en-US"/>
+            </a:p>
+          </p:txBody>
+        </p:sp>
+        <p:cxnSp>
+          <p:nvCxnSpPr>
+            <p:cNvPr id="25" name="直接箭头连接符 24"/>
+            <p:cNvCxnSpPr/>
+            <p:nvPr/>
+          </p:nvCxnSpPr>
+          <p:spPr>
+            <a:xfrm flipV="1">
+              <a:off x="5284" y="6132"/>
+              <a:ext cx="0" cy="3192"/>
+            </a:xfrm>
+            <a:prstGeom prst="straightConnector1">
+              <a:avLst/>
+            </a:prstGeom>
+            <a:ln>
+              <a:tailEnd type="arrow" w="med" len="med"/>
+            </a:ln>
+          </p:spPr>
+          <p:style>
+            <a:lnRef idx="2">
+              <a:schemeClr val="accent3"/>
+            </a:lnRef>
+            <a:fillRef idx="0">
+              <a:schemeClr val="accent3"/>
+            </a:fillRef>
+            <a:effectRef idx="1">
+              <a:schemeClr val="accent3"/>
+            </a:effectRef>
+            <a:fontRef idx="minor">
+              <a:schemeClr val="tx1"/>
+            </a:fontRef>
+          </p:style>
+        </p:cxnSp>
+        <p:cxnSp>
+          <p:nvCxnSpPr>
+            <p:cNvPr id="28" name="直接箭头连接符 27"/>
+            <p:cNvCxnSpPr>
+              <a:endCxn id="3" idx="2"/>
+            </p:cNvCxnSpPr>
+            <p:nvPr/>
+          </p:nvCxnSpPr>
+          <p:spPr>
+            <a:xfrm flipH="1">
+              <a:off x="4678" y="6132"/>
+              <a:ext cx="606" cy="2493"/>
+            </a:xfrm>
+            <a:prstGeom prst="straightConnector1">
+              <a:avLst/>
+            </a:prstGeom>
+            <a:ln>
+              <a:tailEnd type="arrow"/>
+            </a:ln>
+          </p:spPr>
+          <p:style>
+            <a:lnRef idx="1">
+              <a:schemeClr val="accent1"/>
+            </a:lnRef>
+            <a:fillRef idx="0">
+              <a:schemeClr val="accent1"/>
+            </a:fillRef>
+            <a:effectRef idx="0">
+              <a:schemeClr val="accent1"/>
+            </a:effectRef>
+            <a:fontRef idx="minor">
+              <a:schemeClr val="tx1"/>
+            </a:fontRef>
+          </p:style>
+        </p:cxnSp>
+        <p:sp>
+          <p:nvSpPr>
+            <p:cNvPr id="31" name="文本框 30"/>
+            <p:cNvSpPr txBox="1"/>
+            <p:nvPr/>
+          </p:nvSpPr>
+          <p:spPr>
+            <a:xfrm>
+              <a:off x="5301" y="7189"/>
+              <a:ext cx="849" cy="580"/>
+            </a:xfrm>
+            <a:prstGeom prst="rect">
+              <a:avLst/>
+            </a:prstGeom>
+            <a:noFill/>
+          </p:spPr>
+          <p:txBody>
+            <a:bodyPr wrap="square" rtlCol="0">
+              <a:spAutoFit/>
+            </a:bodyPr>
+            <a:p>
+              <a:r>
+                <a:rPr lang="en-US" altLang="zh-CN"/>
+                <a:t>a1</a:t>
+              </a:r>
+              <a:endParaRPr lang="en-US" altLang="zh-CN"/>
+            </a:p>
+          </p:txBody>
+        </p:sp>
+        <p:sp>
+          <p:nvSpPr>
+            <p:cNvPr id="32" name="文本框 31"/>
+            <p:cNvSpPr txBox="1"/>
+            <p:nvPr/>
+          </p:nvSpPr>
+          <p:spPr>
+            <a:xfrm>
+              <a:off x="4145" y="7073"/>
+              <a:ext cx="833" cy="580"/>
+            </a:xfrm>
+            <a:prstGeom prst="rect">
+              <a:avLst/>
+            </a:prstGeom>
+            <a:noFill/>
+          </p:spPr>
+          <p:txBody>
+            <a:bodyPr wrap="square" rtlCol="0">
+              <a:spAutoFit/>
+            </a:bodyPr>
+            <a:p>
+              <a:r>
+                <a:rPr lang="en-US" altLang="zh-CN"/>
+                <a:t>a2</a:t>
+              </a:r>
+              <a:endParaRPr lang="en-US" altLang="zh-CN"/>
+            </a:p>
+          </p:txBody>
+        </p:sp>
+        <p:sp>
+          <p:nvSpPr>
+            <p:cNvPr id="33" name="文本框 32"/>
+            <p:cNvSpPr txBox="1"/>
+            <p:nvPr/>
+          </p:nvSpPr>
+          <p:spPr>
+            <a:xfrm>
+              <a:off x="3661" y="9025"/>
+              <a:ext cx="1317" cy="580"/>
+            </a:xfrm>
+            <a:prstGeom prst="rect">
+              <a:avLst/>
+            </a:prstGeom>
+            <a:noFill/>
+          </p:spPr>
+          <p:txBody>
+            <a:bodyPr wrap="square" rtlCol="0">
+              <a:spAutoFit/>
+            </a:bodyPr>
+            <a:p>
+              <a:r>
+                <a:rPr lang="en-US" altLang="zh-CN"/>
+                <a:t>Joint1</a:t>
+              </a:r>
+              <a:endParaRPr lang="en-US" altLang="zh-CN"/>
+            </a:p>
+          </p:txBody>
+        </p:sp>
+        <p:sp>
+          <p:nvSpPr>
+            <p:cNvPr id="34" name="文本框 33"/>
+            <p:cNvSpPr txBox="1"/>
+            <p:nvPr/>
+          </p:nvSpPr>
+          <p:spPr>
+            <a:xfrm>
+              <a:off x="3515" y="5832"/>
+              <a:ext cx="1317" cy="580"/>
+            </a:xfrm>
+            <a:prstGeom prst="rect">
+              <a:avLst/>
+            </a:prstGeom>
+            <a:noFill/>
+          </p:spPr>
+          <p:txBody>
+            <a:bodyPr wrap="square" rtlCol="0">
+              <a:spAutoFit/>
+            </a:bodyPr>
+            <a:p>
+              <a:r>
+                <a:rPr lang="en-US" altLang="zh-CN"/>
+                <a:t>Joint2</a:t>
+              </a:r>
+              <a:endParaRPr lang="en-US" altLang="zh-CN"/>
+            </a:p>
+          </p:txBody>
+        </p:sp>
+        <p:sp>
+          <p:nvSpPr>
+            <p:cNvPr id="35" name="文本框 34"/>
+            <p:cNvSpPr txBox="1"/>
+            <p:nvPr/>
+          </p:nvSpPr>
+          <p:spPr>
+            <a:xfrm>
+              <a:off x="3076" y="8059"/>
+              <a:ext cx="1317" cy="580"/>
+            </a:xfrm>
+            <a:prstGeom prst="rect">
+              <a:avLst/>
+            </a:prstGeom>
+            <a:noFill/>
+          </p:spPr>
+          <p:txBody>
+            <a:bodyPr wrap="square" rtlCol="0">
+              <a:spAutoFit/>
+            </a:bodyPr>
+            <a:p>
+              <a:r>
+                <a:rPr lang="en-US" altLang="zh-CN"/>
+                <a:t>Joint3</a:t>
+              </a:r>
+              <a:endParaRPr lang="en-US" altLang="zh-CN"/>
+            </a:p>
+          </p:txBody>
+        </p:sp>
+        <p:sp>
+          <p:nvSpPr>
+            <p:cNvPr id="3" name="饼形 2"/>
+            <p:cNvSpPr/>
+            <p:nvPr/>
+          </p:nvSpPr>
+          <p:spPr>
+            <a:xfrm rot="2940000">
+              <a:off x="4364" y="8452"/>
+              <a:ext cx="1827" cy="1725"/>
+            </a:xfrm>
+            <a:prstGeom prst="pie">
+              <a:avLst>
+                <a:gd name="adj1" fmla="val 5355248"/>
+                <a:gd name="adj2" fmla="val 17065503"/>
+              </a:avLst>
+            </a:prstGeom>
+            <a:solidFill>
+              <a:schemeClr val="accent5">
+                <a:alpha val="34000"/>
+              </a:schemeClr>
+            </a:solidFill>
+          </p:spPr>
+          <p:style>
+            <a:lnRef idx="3">
+              <a:schemeClr val="lt1"/>
+            </a:lnRef>
+            <a:fillRef idx="1">
+              <a:schemeClr val="accent5"/>
+            </a:fillRef>
+            <a:effectRef idx="1">
+              <a:schemeClr val="accent5"/>
+            </a:effectRef>
+            <a:fontRef idx="minor">
+              <a:schemeClr val="lt1"/>
+            </a:fontRef>
+          </p:style>
+          <p:txBody>
+            <a:bodyPr rtlCol="0" anchor="ctr"/>
+            <a:p>
+              <a:pPr algn="ctr"/>
+              <a:endParaRPr lang="zh-CN" altLang="en-US">
+                <a:solidFill>
+                  <a:schemeClr val="tx1"/>
+                </a:solidFill>
+              </a:endParaRPr>
+            </a:p>
+          </p:txBody>
+        </p:sp>
+      </p:grpSp>
+    </p:spTree>
+    <p:custDataLst>
+      <p:tags r:id="rId1"/>
+    </p:custDataLst>
+  </p:cSld>
+  <p:clrMapOvr>
+    <a:masterClrMapping/>
+  </p:clrMapOvr>
+</p:sld>
+</file>
+
+<file path=ppt/slides/slide8.xml><?xml version="1.0" encoding="utf-8"?>
+<p:sld xmlns:a="http://schemas.openxmlformats.org/drawingml/2006/main" xmlns:r="http://schemas.openxmlformats.org/officeDocument/2006/relationships" xmlns:p="http://schemas.openxmlformats.org/presentationml/2006/main">
+  <p:cSld>
+    <p:spTree>
+      <p:nvGrpSpPr>
+        <p:cNvPr id="1" name=""/>
+        <p:cNvGrpSpPr/>
+        <p:nvPr/>
+      </p:nvGrpSpPr>
+      <p:grpSpPr/>
+      <p:sp>
+        <p:nvSpPr>
+          <p:cNvPr id="30" name="饼形 29"/>
+          <p:cNvSpPr/>
+          <p:nvPr/>
+        </p:nvSpPr>
+        <p:spPr>
+          <a:xfrm rot="11940000">
+            <a:off x="7372350" y="4236720"/>
+            <a:ext cx="2169160" cy="2260600"/>
+          </a:xfrm>
+          <a:prstGeom prst="pie">
+            <a:avLst>
+              <a:gd name="adj1" fmla="val 3862656"/>
+              <a:gd name="adj2" fmla="val 16200000"/>
+            </a:avLst>
+          </a:prstGeom>
+          <a:solidFill>
+            <a:schemeClr val="accent1">
+              <a:alpha val="28000"/>
+            </a:schemeClr>
+          </a:solidFill>
+        </p:spPr>
+        <p:style>
+          <a:lnRef idx="2">
+            <a:schemeClr val="accent1">
+              <a:shade val="50000"/>
+            </a:schemeClr>
+          </a:lnRef>
+          <a:fillRef idx="1">
+            <a:schemeClr val="accent1"/>
+          </a:fillRef>
+          <a:effectRef idx="0">
+            <a:schemeClr val="accent1"/>
+          </a:effectRef>
+          <a:fontRef idx="minor">
+            <a:schemeClr val="lt1"/>
+          </a:fontRef>
+        </p:style>
+        <p:txBody>
+          <a:bodyPr rtlCol="0" anchor="ctr"/>
+          <a:p>
+            <a:pPr algn="ctr"/>
+            <a:endParaRPr lang="zh-CN" altLang="en-US">
+              <a:solidFill>
+                <a:schemeClr val="tx1"/>
+              </a:solidFill>
+            </a:endParaRPr>
+          </a:p>
+        </p:txBody>
+      </p:sp>
+      <p:sp>
+        <p:nvSpPr>
+          <p:cNvPr id="15" name="饼形 14"/>
+          <p:cNvSpPr/>
+          <p:nvPr/>
+        </p:nvSpPr>
+        <p:spPr>
+          <a:xfrm rot="5400000">
+            <a:off x="4442460" y="2252980"/>
+            <a:ext cx="4949190" cy="5422265"/>
+          </a:xfrm>
+          <a:prstGeom prst="pie">
+            <a:avLst>
+              <a:gd name="adj1" fmla="val 5355248"/>
+              <a:gd name="adj2" fmla="val 17100097"/>
+            </a:avLst>
+          </a:prstGeom>
+          <a:solidFill>
+            <a:schemeClr val="accent5">
+              <a:alpha val="34000"/>
+            </a:schemeClr>
+          </a:solidFill>
+        </p:spPr>
+        <p:style>
+          <a:lnRef idx="3">
+            <a:schemeClr val="lt1"/>
+          </a:lnRef>
+          <a:fillRef idx="1">
+            <a:schemeClr val="accent5"/>
+          </a:fillRef>
+          <a:effectRef idx="1">
+            <a:schemeClr val="accent5"/>
+          </a:effectRef>
+          <a:fontRef idx="minor">
+            <a:schemeClr val="lt1"/>
+          </a:fontRef>
+        </p:style>
+        <p:txBody>
+          <a:bodyPr rtlCol="0" anchor="ctr"/>
+          <a:p>
+            <a:pPr algn="ctr"/>
+            <a:endParaRPr lang="zh-CN" altLang="en-US">
+              <a:solidFill>
+                <a:schemeClr val="tx1"/>
+              </a:solidFill>
+            </a:endParaRPr>
+          </a:p>
+        </p:txBody>
+      </p:sp>
+      <p:sp>
+        <p:nvSpPr>
+          <p:cNvPr id="2" name="标题 1"/>
+          <p:cNvSpPr>
+            <a:spLocks noGrp="1"/>
+          </p:cNvSpPr>
+          <p:nvPr>
+            <p:ph type="title"/>
+          </p:nvPr>
+        </p:nvSpPr>
+        <p:spPr/>
+        <p:txBody>
+          <a:bodyPr/>
+          <a:p>
+            <a:r>
+              <a:rPr lang="en-US" altLang="zh-CN"/>
+              <a:t>reachable space</a:t>
+            </a:r>
+            <a:endParaRPr lang="en-US" altLang="zh-CN"/>
+          </a:p>
+        </p:txBody>
+      </p:sp>
+      <p:sp>
+        <p:nvSpPr>
+          <p:cNvPr id="4" name="饼形 3"/>
+          <p:cNvSpPr/>
+          <p:nvPr/>
+        </p:nvSpPr>
+        <p:spPr>
+          <a:xfrm rot="5400000">
+            <a:off x="5368290" y="3348990"/>
+            <a:ext cx="3098165" cy="3230880"/>
+          </a:xfrm>
+          <a:prstGeom prst="pie">
+            <a:avLst>
+              <a:gd name="adj1" fmla="val 5361705"/>
+              <a:gd name="adj2" fmla="val 17066869"/>
+            </a:avLst>
+          </a:prstGeom>
+          <a:solidFill>
+            <a:schemeClr val="accent3">
+              <a:lumMod val="40000"/>
+              <a:lumOff val="60000"/>
+              <a:alpha val="52000"/>
+            </a:schemeClr>
+          </a:solidFill>
+        </p:spPr>
+        <p:style>
+          <a:lnRef idx="1">
+            <a:schemeClr val="accent3"/>
+          </a:lnRef>
+          <a:fillRef idx="2">
+            <a:schemeClr val="accent3"/>
+          </a:fillRef>
+          <a:effectRef idx="1">
+            <a:schemeClr val="accent3"/>
+          </a:effectRef>
+          <a:fontRef idx="minor">
+            <a:schemeClr val="dk1"/>
+          </a:fontRef>
+        </p:style>
+        <p:txBody>
+          <a:bodyPr rtlCol="0" anchor="ctr"/>
+          <a:p>
+            <a:pPr algn="ctr"/>
+            <a:endParaRPr lang="zh-CN" altLang="en-US">
+              <a:solidFill>
+                <a:schemeClr val="tx1"/>
+              </a:solidFill>
+            </a:endParaRPr>
+          </a:p>
+        </p:txBody>
+      </p:sp>
+      <p:sp>
+        <p:nvSpPr>
+          <p:cNvPr id="6" name="文本框 5"/>
+          <p:cNvSpPr txBox="1"/>
+          <p:nvPr/>
+        </p:nvSpPr>
+        <p:spPr>
+          <a:xfrm>
+            <a:off x="6952615" y="2954655"/>
+            <a:ext cx="1337310" cy="368300"/>
+          </a:xfrm>
+          <a:prstGeom prst="rect">
+            <a:avLst/>
+          </a:prstGeom>
+          <a:noFill/>
+        </p:spPr>
+        <p:txBody>
+          <a:bodyPr wrap="square" rtlCol="0">
+            <a:spAutoFit/>
+          </a:bodyPr>
+          <a:p>
+            <a:r>
+              <a:rPr lang="en-US" altLang="zh-CN"/>
+              <a:t>r=a1+a2</a:t>
+            </a:r>
+            <a:endParaRPr lang="en-US" altLang="zh-CN"/>
+          </a:p>
+        </p:txBody>
+      </p:sp>
+      <p:sp>
+        <p:nvSpPr>
+          <p:cNvPr id="13" name="饼形 12"/>
+          <p:cNvSpPr/>
+          <p:nvPr/>
+        </p:nvSpPr>
+        <p:spPr>
+          <a:xfrm rot="17700000">
+            <a:off x="4211320" y="3886835"/>
+            <a:ext cx="2190750" cy="2229485"/>
+          </a:xfrm>
+          <a:prstGeom prst="pie">
+            <a:avLst>
+              <a:gd name="adj1" fmla="val 3862656"/>
+              <a:gd name="adj2" fmla="val 16200000"/>
+            </a:avLst>
+          </a:prstGeom>
+          <a:solidFill>
+            <a:schemeClr val="accent1">
+              <a:alpha val="28000"/>
+            </a:schemeClr>
+          </a:solidFill>
+        </p:spPr>
+        <p:style>
+          <a:lnRef idx="2">
+            <a:schemeClr val="accent1">
+              <a:shade val="50000"/>
+            </a:schemeClr>
+          </a:lnRef>
+          <a:fillRef idx="1">
+            <a:schemeClr val="accent1"/>
+          </a:fillRef>
+          <a:effectRef idx="0">
+            <a:schemeClr val="accent1"/>
+          </a:effectRef>
+          <a:fontRef idx="minor">
+            <a:schemeClr val="lt1"/>
+          </a:fontRef>
+        </p:style>
+        <p:txBody>
+          <a:bodyPr rtlCol="0" anchor="ctr"/>
+          <a:p>
+            <a:pPr algn="ctr"/>
+            <a:endParaRPr lang="zh-CN" altLang="en-US">
+              <a:solidFill>
+                <a:schemeClr val="tx1"/>
+              </a:solidFill>
+            </a:endParaRPr>
+          </a:p>
+        </p:txBody>
+      </p:sp>
+      <p:cxnSp>
+        <p:nvCxnSpPr>
+          <p:cNvPr id="16" name="直接箭头连接符 15"/>
+          <p:cNvCxnSpPr/>
+          <p:nvPr/>
+        </p:nvCxnSpPr>
+        <p:spPr>
+          <a:xfrm flipH="1" flipV="1">
+            <a:off x="6283960" y="3573780"/>
+            <a:ext cx="636905" cy="1391920"/>
+          </a:xfrm>
+          <a:prstGeom prst="straightConnector1">
+            <a:avLst/>
+          </a:prstGeom>
+          <a:ln>
+            <a:tailEnd type="arrow" w="med" len="med"/>
+          </a:ln>
+        </p:spPr>
+        <p:style>
+          <a:lnRef idx="2">
+            <a:schemeClr val="accent3"/>
+          </a:lnRef>
+          <a:fillRef idx="0">
+            <a:schemeClr val="accent3"/>
+          </a:fillRef>
+          <a:effectRef idx="1">
+            <a:schemeClr val="accent3"/>
+          </a:effectRef>
+          <a:fontRef idx="minor">
+            <a:schemeClr val="tx1"/>
+          </a:fontRef>
+        </p:style>
+      </p:cxnSp>
+      <p:sp>
+        <p:nvSpPr>
+          <p:cNvPr id="17" name="文本框 16"/>
+          <p:cNvSpPr txBox="1"/>
+          <p:nvPr/>
+        </p:nvSpPr>
+        <p:spPr>
+          <a:xfrm>
+            <a:off x="5949950" y="4084955"/>
+            <a:ext cx="1337310" cy="368300"/>
+          </a:xfrm>
+          <a:prstGeom prst="rect">
+            <a:avLst/>
+          </a:prstGeom>
+          <a:noFill/>
+        </p:spPr>
+        <p:txBody>
+          <a:bodyPr wrap="square" rtlCol="0">
+            <a:spAutoFit/>
+          </a:bodyPr>
+          <a:p>
+            <a:r>
+              <a:rPr lang="en-US" altLang="zh-CN"/>
+              <a:t>r=a1</a:t>
+            </a:r>
+            <a:endParaRPr lang="en-US" altLang="zh-CN"/>
+          </a:p>
+        </p:txBody>
+      </p:sp>
+      <p:sp>
+        <p:nvSpPr>
+          <p:cNvPr id="18" name="文本框 17"/>
+          <p:cNvSpPr txBox="1"/>
+          <p:nvPr/>
+        </p:nvSpPr>
+        <p:spPr>
+          <a:xfrm>
+            <a:off x="4506595" y="5264785"/>
+            <a:ext cx="1337310" cy="368300"/>
+          </a:xfrm>
+          <a:prstGeom prst="rect">
+            <a:avLst/>
+          </a:prstGeom>
+          <a:noFill/>
+        </p:spPr>
+        <p:txBody>
+          <a:bodyPr wrap="square" rtlCol="0">
+            <a:spAutoFit/>
+          </a:bodyPr>
+          <a:p>
+            <a:r>
+              <a:rPr lang="en-US" altLang="zh-CN"/>
+              <a:t>r=a2</a:t>
+            </a:r>
+            <a:endParaRPr lang="en-US" altLang="zh-CN"/>
+          </a:p>
+        </p:txBody>
+      </p:sp>
+      <p:sp>
+        <p:nvSpPr>
+          <p:cNvPr id="19" name="文本框 18"/>
+          <p:cNvSpPr txBox="1"/>
+          <p:nvPr/>
+        </p:nvSpPr>
+        <p:spPr>
+          <a:xfrm>
+            <a:off x="8533130" y="5013325"/>
+            <a:ext cx="1337310" cy="368300"/>
+          </a:xfrm>
+          <a:prstGeom prst="rect">
+            <a:avLst/>
+          </a:prstGeom>
+          <a:noFill/>
+        </p:spPr>
+        <p:txBody>
+          <a:bodyPr wrap="square" rtlCol="0">
+            <a:spAutoFit/>
+          </a:bodyPr>
+          <a:p>
+            <a:r>
+              <a:rPr lang="en-US" altLang="zh-CN"/>
+              <a:t>r=a2</a:t>
+            </a:r>
+            <a:endParaRPr lang="en-US" altLang="zh-CN"/>
+          </a:p>
+        </p:txBody>
+      </p:sp>
+      <p:cxnSp>
+        <p:nvCxnSpPr>
+          <p:cNvPr id="20" name="直接箭头连接符 19"/>
+          <p:cNvCxnSpPr/>
+          <p:nvPr/>
+        </p:nvCxnSpPr>
+        <p:spPr>
+          <a:xfrm flipV="1">
+            <a:off x="6914515" y="2584450"/>
+            <a:ext cx="580390" cy="2383155"/>
+          </a:xfrm>
+          <a:prstGeom prst="straightConnector1">
+            <a:avLst/>
+          </a:prstGeom>
+          <a:ln>
+            <a:tailEnd type="arrow" w="med" len="med"/>
+          </a:ln>
+        </p:spPr>
+        <p:style>
+          <a:lnRef idx="2">
+            <a:schemeClr val="accent5"/>
+          </a:lnRef>
+          <a:fillRef idx="0">
+            <a:schemeClr val="accent5"/>
+          </a:fillRef>
+          <a:effectRef idx="1">
+            <a:schemeClr val="accent5"/>
+          </a:effectRef>
+          <a:fontRef idx="minor">
+            <a:schemeClr val="tx1"/>
+          </a:fontRef>
+        </p:style>
+      </p:cxnSp>
+      <p:sp>
+        <p:nvSpPr>
+          <p:cNvPr id="21" name="椭圆 20"/>
+          <p:cNvSpPr/>
+          <p:nvPr/>
+        </p:nvSpPr>
+        <p:spPr>
+          <a:xfrm>
+            <a:off x="850900" y="5395595"/>
+            <a:ext cx="420370" cy="463550"/>
+          </a:xfrm>
+          <a:prstGeom prst="ellipse">
+            <a:avLst/>
+          </a:prstGeom>
+          <a:solidFill>
+            <a:schemeClr val="accent3">
+              <a:alpha val="44000"/>
+            </a:schemeClr>
+          </a:solidFill>
+        </p:spPr>
+        <p:style>
+          <a:lnRef idx="2">
+            <a:schemeClr val="accent3">
+              <a:shade val="50000"/>
+            </a:schemeClr>
+          </a:lnRef>
+          <a:fillRef idx="1">
+            <a:schemeClr val="accent3"/>
+          </a:fillRef>
+          <a:effectRef idx="0">
+            <a:schemeClr val="accent3"/>
+          </a:effectRef>
+          <a:fontRef idx="minor">
+            <a:schemeClr val="lt1"/>
+          </a:fontRef>
+        </p:style>
+        <p:txBody>
+          <a:bodyPr rtlCol="0" anchor="ctr"/>
+          <a:p>
+            <a:pPr algn="ctr"/>
+            <a:endParaRPr lang="zh-CN" altLang="en-US"/>
+          </a:p>
+        </p:txBody>
+      </p:sp>
+      <p:sp>
+        <p:nvSpPr>
+          <p:cNvPr id="22" name="椭圆 21"/>
+          <p:cNvSpPr/>
+          <p:nvPr/>
+        </p:nvSpPr>
+        <p:spPr>
+          <a:xfrm>
+            <a:off x="850900" y="3415665"/>
+            <a:ext cx="420370" cy="463550"/>
+          </a:xfrm>
+          <a:prstGeom prst="ellipse">
+            <a:avLst/>
+          </a:prstGeom>
+          <a:solidFill>
+            <a:schemeClr val="accent2">
+              <a:alpha val="54000"/>
+            </a:schemeClr>
+          </a:solidFill>
+        </p:spPr>
+        <p:style>
+          <a:lnRef idx="2">
+            <a:schemeClr val="accent2">
+              <a:shade val="50000"/>
+            </a:schemeClr>
+          </a:lnRef>
+          <a:fillRef idx="1">
+            <a:schemeClr val="accent2"/>
+          </a:fillRef>
+          <a:effectRef idx="0">
+            <a:schemeClr val="accent2"/>
+          </a:effectRef>
+          <a:fontRef idx="minor">
+            <a:schemeClr val="lt1"/>
+          </a:fontRef>
+        </p:style>
+        <p:txBody>
+          <a:bodyPr rtlCol="0" anchor="ctr"/>
+          <a:p>
+            <a:pPr algn="ctr"/>
+            <a:endParaRPr lang="zh-CN" altLang="en-US"/>
+          </a:p>
+        </p:txBody>
+      </p:sp>
+      <p:sp>
+        <p:nvSpPr>
+          <p:cNvPr id="24" name="圆柱形 23"/>
+          <p:cNvSpPr/>
+          <p:nvPr/>
+        </p:nvSpPr>
+        <p:spPr>
+          <a:xfrm rot="16200000">
+            <a:off x="823595" y="1881505"/>
+            <a:ext cx="485140" cy="409575"/>
+          </a:xfrm>
+          <a:prstGeom prst="can">
+            <a:avLst/>
+          </a:prstGeom>
+          <a:solidFill>
+            <a:schemeClr val="accent5">
+              <a:alpha val="31000"/>
+            </a:schemeClr>
+          </a:solidFill>
+        </p:spPr>
+        <p:style>
+          <a:lnRef idx="3">
+            <a:schemeClr val="lt1"/>
+          </a:lnRef>
+          <a:fillRef idx="1">
+            <a:schemeClr val="accent5"/>
+          </a:fillRef>
+          <a:effectRef idx="1">
+            <a:schemeClr val="accent5"/>
+          </a:effectRef>
+          <a:fontRef idx="minor">
+            <a:schemeClr val="lt1"/>
+          </a:fontRef>
+        </p:style>
+        <p:txBody>
+          <a:bodyPr rtlCol="0" anchor="ctr"/>
+          <a:p>
+            <a:pPr algn="ctr"/>
+            <a:endParaRPr lang="zh-CN" altLang="en-US"/>
+          </a:p>
+        </p:txBody>
+      </p:sp>
+      <p:cxnSp>
+        <p:nvCxnSpPr>
+          <p:cNvPr id="25" name="直接箭头连接符 24"/>
+          <p:cNvCxnSpPr/>
+          <p:nvPr/>
+        </p:nvCxnSpPr>
+        <p:spPr>
+          <a:xfrm flipV="1">
+            <a:off x="1056005" y="3606165"/>
+            <a:ext cx="0" cy="2026920"/>
+          </a:xfrm>
+          <a:prstGeom prst="straightConnector1">
+            <a:avLst/>
+          </a:prstGeom>
+          <a:ln>
+            <a:tailEnd type="arrow" w="med" len="med"/>
+          </a:ln>
+        </p:spPr>
+        <p:style>
+          <a:lnRef idx="2">
+            <a:schemeClr val="accent3"/>
+          </a:lnRef>
+          <a:fillRef idx="0">
+            <a:schemeClr val="accent3"/>
+          </a:fillRef>
+          <a:effectRef idx="1">
+            <a:schemeClr val="accent3"/>
+          </a:effectRef>
+          <a:fontRef idx="minor">
+            <a:schemeClr val="tx1"/>
+          </a:fontRef>
+        </p:style>
+      </p:cxnSp>
+      <p:cxnSp>
+        <p:nvCxnSpPr>
+          <p:cNvPr id="26" name="直接箭头连接符 25"/>
+          <p:cNvCxnSpPr/>
+          <p:nvPr/>
+        </p:nvCxnSpPr>
+        <p:spPr>
+          <a:xfrm flipH="1">
+            <a:off x="4290695" y="4967605"/>
+            <a:ext cx="1050925" cy="399415"/>
+          </a:xfrm>
+          <a:prstGeom prst="straightConnector1">
+            <a:avLst/>
+          </a:prstGeom>
+          <a:ln>
+            <a:tailEnd type="arrow" w="med" len="med"/>
+          </a:ln>
+        </p:spPr>
+        <p:style>
+          <a:lnRef idx="3">
+            <a:schemeClr val="accent1"/>
+          </a:lnRef>
+          <a:fillRef idx="0">
+            <a:schemeClr val="accent1"/>
+          </a:fillRef>
+          <a:effectRef idx="2">
+            <a:schemeClr val="accent1"/>
+          </a:effectRef>
+          <a:fontRef idx="minor">
+            <a:schemeClr val="tx1"/>
+          </a:fontRef>
+        </p:style>
+      </p:cxnSp>
+      <p:cxnSp>
+        <p:nvCxnSpPr>
+          <p:cNvPr id="27" name="直接箭头连接符 26"/>
+          <p:cNvCxnSpPr/>
+          <p:nvPr/>
+        </p:nvCxnSpPr>
+        <p:spPr>
+          <a:xfrm flipV="1">
+            <a:off x="8466455" y="5345430"/>
+            <a:ext cx="1029335" cy="2540"/>
+          </a:xfrm>
+          <a:prstGeom prst="straightConnector1">
+            <a:avLst/>
+          </a:prstGeom>
+          <a:ln>
+            <a:tailEnd type="arrow" w="med" len="med"/>
+          </a:ln>
+        </p:spPr>
+        <p:style>
+          <a:lnRef idx="3">
+            <a:schemeClr val="accent1"/>
+          </a:lnRef>
+          <a:fillRef idx="0">
+            <a:schemeClr val="accent1"/>
+          </a:fillRef>
+          <a:effectRef idx="2">
+            <a:schemeClr val="accent1"/>
+          </a:effectRef>
+          <a:fontRef idx="minor">
+            <a:schemeClr val="tx1"/>
+          </a:fontRef>
+        </p:style>
+      </p:cxnSp>
+      <p:cxnSp>
+        <p:nvCxnSpPr>
+          <p:cNvPr id="28" name="直接箭头连接符 27"/>
+          <p:cNvCxnSpPr/>
+          <p:nvPr/>
+        </p:nvCxnSpPr>
+        <p:spPr>
+          <a:xfrm flipV="1">
+            <a:off x="1066800" y="2118360"/>
+            <a:ext cx="0" cy="1520190"/>
+          </a:xfrm>
+          <a:prstGeom prst="straightConnector1">
+            <a:avLst/>
+          </a:prstGeom>
+          <a:ln>
+            <a:tailEnd type="arrow"/>
+          </a:ln>
+        </p:spPr>
+        <p:style>
+          <a:lnRef idx="1">
+            <a:schemeClr val="accent1"/>
+          </a:lnRef>
+          <a:fillRef idx="0">
+            <a:schemeClr val="accent1"/>
+          </a:fillRef>
+          <a:effectRef idx="0">
+            <a:schemeClr val="accent1"/>
+          </a:effectRef>
+          <a:fontRef idx="minor">
+            <a:schemeClr val="tx1"/>
+          </a:fontRef>
+        </p:style>
+      </p:cxnSp>
+      <p:sp>
+        <p:nvSpPr>
+          <p:cNvPr id="29" name="饼形 28"/>
+          <p:cNvSpPr/>
+          <p:nvPr/>
+        </p:nvSpPr>
+        <p:spPr>
+          <a:xfrm rot="4020000">
+            <a:off x="6464300" y="4520565"/>
+            <a:ext cx="879475" cy="902335"/>
+          </a:xfrm>
+          <a:prstGeom prst="pie">
+            <a:avLst>
+              <a:gd name="adj1" fmla="val 3847634"/>
+              <a:gd name="adj2" fmla="val 16200000"/>
+            </a:avLst>
+          </a:prstGeom>
+          <a:solidFill>
+            <a:schemeClr val="dk1">
+              <a:alpha val="39000"/>
+            </a:schemeClr>
+          </a:solidFill>
+        </p:spPr>
+        <p:style>
+          <a:lnRef idx="3">
+            <a:schemeClr val="lt1"/>
+          </a:lnRef>
+          <a:fillRef idx="1">
+            <a:schemeClr val="dk1"/>
+          </a:fillRef>
+          <a:effectRef idx="1">
+            <a:schemeClr val="dk1"/>
+          </a:effectRef>
+          <a:fontRef idx="minor">
+            <a:schemeClr val="lt1"/>
+          </a:fontRef>
+        </p:style>
+        <p:txBody>
+          <a:bodyPr rtlCol="0" anchor="ctr"/>
+          <a:p>
+            <a:pPr algn="ctr"/>
+            <a:endParaRPr lang="zh-CN" altLang="en-US">
+              <a:solidFill>
+                <a:schemeClr val="tx1"/>
+              </a:solidFill>
+            </a:endParaRPr>
+          </a:p>
+        </p:txBody>
+      </p:sp>
+    </p:spTree>
+    <p:custDataLst>
+      <p:tags r:id="rId1"/>
+    </p:custDataLst>
+  </p:cSld>
+  <p:clrMapOvr>
+    <a:masterClrMapping/>
+  </p:clrMapOvr>
+</p:sld>
+</file>
+
 <file path=ppt/tags/tag1.xml><?xml version="1.0" encoding="utf-8"?>
 <p:tagLst xmlns:p="http://schemas.openxmlformats.org/presentationml/2006/main">
   <p:tag name="KSO_WM_UNIT_HIGHLIGHT" val="0"/>
@@ -6226,6 +8346,30 @@
 </file>
 
 <file path=ppt/tags/tag71.xml><?xml version="1.0" encoding="utf-8"?>
+<p:tagLst xmlns:p="http://schemas.openxmlformats.org/presentationml/2006/main">
+  <p:tag name="KSO_WM_BEAUTIFY_FLAG" val="#wm#"/>
+  <p:tag name="KSO_WM_TEMPLATE_CATEGORY" val="custom"/>
+  <p:tag name="KSO_WM_TEMPLATE_INDEX" val="20205176"/>
+</p:tagLst>
+</file>
+
+<file path=ppt/tags/tag72.xml><?xml version="1.0" encoding="utf-8"?>
+<p:tagLst xmlns:p="http://schemas.openxmlformats.org/presentationml/2006/main">
+  <p:tag name="KSO_WM_BEAUTIFY_FLAG" val="#wm#"/>
+  <p:tag name="KSO_WM_TEMPLATE_CATEGORY" val="custom"/>
+  <p:tag name="KSO_WM_TEMPLATE_INDEX" val="20205176"/>
+</p:tagLst>
+</file>
+
+<file path=ppt/tags/tag73.xml><?xml version="1.0" encoding="utf-8"?>
+<p:tagLst xmlns:p="http://schemas.openxmlformats.org/presentationml/2006/main">
+  <p:tag name="KSO_WM_BEAUTIFY_FLAG" val="#wm#"/>
+  <p:tag name="KSO_WM_TEMPLATE_CATEGORY" val="custom"/>
+  <p:tag name="KSO_WM_TEMPLATE_INDEX" val="20205176"/>
+</p:tagLst>
+</file>
+
+<file path=ppt/tags/tag74.xml><?xml version="1.0" encoding="utf-8"?>
 <p:tagLst xmlns:p="http://schemas.openxmlformats.org/presentationml/2006/main">
   <p:tag name="KSO_WM_BEAUTIFY_FLAG" val="#wm#"/>
   <p:tag name="KSO_WM_TEMPLATE_CATEGORY" val="custom"/>

</xml_diff>

<commit_message>
fix some issues about update DH parameters added some callback functions
</commit_message>
<xml_diff>
--- a/RobotArm.pptx
+++ b/RobotArm.pptx
@@ -4060,7 +4060,7 @@
         </p:nvSpPr>
         <p:spPr>
           <a:xfrm>
-            <a:off x="4693920" y="1748790"/>
+            <a:off x="4422775" y="3341370"/>
             <a:ext cx="384810" cy="275590"/>
           </a:xfrm>
           <a:prstGeom prst="rect">
@@ -4089,7 +4089,7 @@
         </p:nvGrpSpPr>
         <p:grpSpPr>
           <a:xfrm>
-            <a:off x="1405255" y="5056505"/>
+            <a:off x="1433830" y="5059045"/>
             <a:ext cx="1591310" cy="1186180"/>
             <a:chOff x="3313" y="6041"/>
             <a:chExt cx="2506" cy="1868"/>
@@ -4118,7 +4118,7 @@
             <a:p>
               <a:r>
                 <a:rPr lang="en-US" altLang="zh-CN" sz="1200"/>
-                <a:t>X0</a:t>
+                <a:t>X</a:t>
               </a:r>
               <a:endParaRPr lang="en-US" altLang="zh-CN" sz="1200"/>
             </a:p>
@@ -4147,7 +4147,7 @@
             <a:p>
               <a:r>
                 <a:rPr lang="en-US" altLang="zh-CN" sz="1200"/>
-                <a:t>Z0</a:t>
+                <a:t>Z</a:t>
               </a:r>
               <a:endParaRPr lang="en-US" altLang="zh-CN" sz="1200"/>
             </a:p>
@@ -4275,7 +4275,7 @@
             <a:p>
               <a:r>
                 <a:rPr lang="en-US" altLang="zh-CN" sz="1200"/>
-                <a:t>Y0</a:t>
+                <a:t>Y</a:t>
               </a:r>
               <a:endParaRPr lang="en-US" altLang="zh-CN" sz="1200"/>
             </a:p>
@@ -4299,13 +4299,13 @@
         </p:spPr>
         <p:style>
           <a:lnRef idx="1">
-            <a:schemeClr val="accent3"/>
+            <a:schemeClr val="accent5"/>
           </a:lnRef>
           <a:fillRef idx="0">
-            <a:schemeClr val="accent3"/>
+            <a:schemeClr val="accent5"/>
           </a:fillRef>
           <a:effectRef idx="0">
-            <a:schemeClr val="accent3"/>
+            <a:schemeClr val="accent5"/>
           </a:effectRef>
           <a:fontRef idx="minor">
             <a:schemeClr val="tx1"/>
@@ -4435,9 +4435,9 @@
           <p:nvPr/>
         </p:nvCxnSpPr>
         <p:spPr>
-          <a:xfrm flipV="1">
-            <a:off x="4864100" y="2040255"/>
-            <a:ext cx="3175" cy="852170"/>
+          <a:xfrm>
+            <a:off x="4864100" y="2892425"/>
+            <a:ext cx="18415" cy="724535"/>
           </a:xfrm>
           <a:prstGeom prst="straightConnector1">
             <a:avLst/>
@@ -4544,7 +4544,7 @@
         <p:spPr>
           <a:xfrm>
             <a:off x="3416300" y="5961380"/>
-            <a:ext cx="384810" cy="275590"/>
+            <a:ext cx="1007110" cy="275590"/>
           </a:xfrm>
           <a:prstGeom prst="rect">
             <a:avLst/>
@@ -4562,7 +4562,7 @@
                   <a:srgbClr val="FF0000"/>
                 </a:solidFill>
               </a:rPr>
-              <a:t>a0</a:t>
+              <a:t>baseY</a:t>
             </a:r>
             <a:endParaRPr lang="en-US" altLang="zh-CN" sz="1200">
               <a:solidFill>
@@ -4583,8 +4583,8 @@
           </p:nvPr>
         </p:nvGraphicFramePr>
         <p:xfrm>
-          <a:off x="7291705" y="4166870"/>
-          <a:ext cx="4715791" cy="1678940"/>
+          <a:off x="6557645" y="4468495"/>
+          <a:ext cx="3812540" cy="1678940"/>
         </p:xfrm>
         <a:graphic>
           <a:graphicData uri="http://schemas.openxmlformats.org/drawingml/2006/table">
@@ -4593,12 +4593,12 @@
                 <a:tableStyleId>{5C22544A-7EE6-4342-B048-85BDC9FD1C3A}</a:tableStyleId>
               </a:tblPr>
               <a:tblGrid>
-                <a:gridCol w="445135"/>
-                <a:gridCol w="609600"/>
-                <a:gridCol w="655320"/>
-                <a:gridCol w="580390"/>
-                <a:gridCol w="538480"/>
-                <a:gridCol w="1886866"/>
+                <a:gridCol w="427355"/>
+                <a:gridCol w="553720"/>
+                <a:gridCol w="645795"/>
+                <a:gridCol w="599440"/>
+                <a:gridCol w="566420"/>
+                <a:gridCol w="1020091"/>
               </a:tblGrid>
               <a:tr h="419735">
                 <a:tc>
@@ -4770,7 +4770,7 @@
                       </a:pPr>
                       <a:r>
                         <a:rPr lang="en-US" altLang="zh-CN"/>
-                        <a:t>L1</a:t>
+                        <a:t>0</a:t>
                       </a:r>
                       <a:endParaRPr lang="en-US" altLang="zh-CN"/>
                     </a:p>
@@ -4818,7 +4818,7 @@
                           <a:latin typeface="宋体" panose="02010600030101010101" pitchFamily="2" charset="-122"/>
                           <a:ea typeface="宋体" panose="02010600030101010101" pitchFamily="2" charset="-122"/>
                         </a:rPr>
-                        <a:t>-19º</a:t>
+                        <a:t>-20º</a:t>
                       </a:r>
                       <a:endParaRPr lang="en-US" altLang="zh-CN">
                         <a:latin typeface="宋体" panose="02010600030101010101" pitchFamily="2" charset="-122"/>
@@ -4943,15 +4943,7 @@
                           <a:latin typeface="宋体" panose="02010600030101010101" pitchFamily="2" charset="-122"/>
                           <a:ea typeface="宋体" panose="02010600030101010101" pitchFamily="2" charset="-122"/>
                         </a:rPr>
-                        <a:t>16.8</a:t>
-                      </a:r>
-                      <a:r>
-                        <a:rPr lang="en-US" altLang="zh-CN" sz="1800">
-                          <a:latin typeface="宋体" panose="02010600030101010101" pitchFamily="2" charset="-122"/>
-                          <a:ea typeface="宋体" panose="02010600030101010101" pitchFamily="2" charset="-122"/>
-                          <a:sym typeface="+mn-ea"/>
-                        </a:rPr>
-                        <a:t>º</a:t>
+                        <a:t>0</a:t>
                       </a:r>
                       <a:endParaRPr lang="en-US" altLang="zh-CN">
                         <a:latin typeface="宋体" panose="02010600030101010101" pitchFamily="2" charset="-122"/>
@@ -5162,7 +5154,7 @@
         </p:nvSpPr>
         <p:spPr>
           <a:xfrm>
-            <a:off x="4864100" y="3137535"/>
+            <a:off x="5012055" y="3046095"/>
             <a:ext cx="384810" cy="275590"/>
           </a:xfrm>
           <a:prstGeom prst="rect">
@@ -5233,7 +5225,7 @@
         </p:nvCxnSpPr>
         <p:spPr>
           <a:xfrm>
-            <a:off x="5222875" y="5001260"/>
+            <a:off x="5027930" y="5008245"/>
             <a:ext cx="26035" cy="1235075"/>
           </a:xfrm>
           <a:prstGeom prst="straightConnector1">
@@ -5246,13 +5238,13 @@
         </p:spPr>
         <p:style>
           <a:lnRef idx="1">
-            <a:schemeClr val="accent3"/>
+            <a:schemeClr val="accent5"/>
           </a:lnRef>
           <a:fillRef idx="0">
-            <a:schemeClr val="accent3"/>
+            <a:schemeClr val="accent5"/>
           </a:fillRef>
           <a:effectRef idx="0">
-            <a:schemeClr val="accent3"/>
+            <a:schemeClr val="accent5"/>
           </a:effectRef>
           <a:fontRef idx="minor">
             <a:schemeClr val="tx1"/>
@@ -5267,8 +5259,8 @@
         </p:nvSpPr>
         <p:spPr>
           <a:xfrm>
-            <a:off x="5325745" y="5511800"/>
-            <a:ext cx="384810" cy="275590"/>
+            <a:off x="4360545" y="5603240"/>
+            <a:ext cx="633095" cy="275590"/>
           </a:xfrm>
           <a:prstGeom prst="rect">
             <a:avLst/>
@@ -5286,13 +5278,42 @@
                   <a:srgbClr val="FF0000"/>
                 </a:solidFill>
               </a:rPr>
-              <a:t>L1</a:t>
+              <a:t>baseZ</a:t>
             </a:r>
             <a:endParaRPr lang="en-US" altLang="zh-CN" sz="1200">
               <a:solidFill>
                 <a:srgbClr val="FF0000"/>
               </a:solidFill>
             </a:endParaRPr>
+          </a:p>
+        </p:txBody>
+      </p:sp>
+      <p:sp>
+        <p:nvSpPr>
+          <p:cNvPr id="7" name="文本框 6"/>
+          <p:cNvSpPr txBox="1"/>
+          <p:nvPr/>
+        </p:nvSpPr>
+        <p:spPr>
+          <a:xfrm>
+            <a:off x="1826260" y="6236335"/>
+            <a:ext cx="529590" cy="368300"/>
+          </a:xfrm>
+          <a:prstGeom prst="rect">
+            <a:avLst/>
+          </a:prstGeom>
+          <a:noFill/>
+        </p:spPr>
+        <p:txBody>
+          <a:bodyPr wrap="square" rtlCol="0">
+            <a:spAutoFit/>
+          </a:bodyPr>
+          <a:p>
+            <a:r>
+              <a:rPr lang="en-US" altLang="zh-CN"/>
+              <a:t>{C}</a:t>
+            </a:r>
+            <a:endParaRPr lang="en-US" altLang="zh-CN"/>
           </a:p>
         </p:txBody>
       </p:sp>

</xml_diff>